<commit_message>
updated ReqCycle in use presentation after first remarks from Jan
</commit_message>
<xml_diff>
--- a/T7.3/TraceabilityArchitecture/reqCycleUse/ReqCyclePossibleUseForArchitectureVerification-V2.pptx
+++ b/T7.3/TraceabilityArchitecture/reqCycleUse/ReqCyclePossibleUseForArchitectureVerification-V2.pptx
@@ -226,7 +226,7 @@
           <a:p>
             <a:fld id="{A4FCF1EC-1C26-6840-B416-A02DC2D3A261}" type="datetimeFigureOut">
               <a:rPr lang="fr-FR" smtClean="0"/>
-              <a:t>12/11/2015</a:t>
+              <a:t>19/11/2015</a:t>
             </a:fld>
             <a:endParaRPr lang="fr-FR"/>
           </a:p>
@@ -392,7 +392,7 @@
           <a:p>
             <a:fld id="{73363D80-F0F9-C544-A2FA-C621D180FDB5}" type="datetimeFigureOut">
               <a:rPr lang="fr-FR" smtClean="0"/>
-              <a:t>12/11/2015</a:t>
+              <a:t>19/11/2015</a:t>
             </a:fld>
             <a:endParaRPr lang="fr-FR"/>
           </a:p>
@@ -842,7 +842,7 @@
           <a:p>
             <a:fld id="{D053FD6A-4CC7-EF45-AB41-64109787680A}" type="datetime1">
               <a:rPr lang="fr-FR" smtClean="0"/>
-              <a:t>12/11/2015</a:t>
+              <a:t>19/11/2015</a:t>
             </a:fld>
             <a:endParaRPr lang="fr-FR"/>
           </a:p>
@@ -1020,7 +1020,7 @@
           <a:p>
             <a:fld id="{56F1F9C0-95E3-8B44-B7AA-AB861706ABA6}" type="datetime1">
               <a:rPr lang="fr-FR" smtClean="0"/>
-              <a:t>12/11/2015</a:t>
+              <a:t>19/11/2015</a:t>
             </a:fld>
             <a:endParaRPr lang="fr-FR"/>
           </a:p>
@@ -1208,7 +1208,7 @@
           <a:p>
             <a:fld id="{6AF4615C-F89B-1646-BB06-C187E39C5F9F}" type="datetime1">
               <a:rPr lang="fr-FR" smtClean="0"/>
-              <a:t>12/11/2015</a:t>
+              <a:t>19/11/2015</a:t>
             </a:fld>
             <a:endParaRPr lang="fr-FR"/>
           </a:p>
@@ -1386,7 +1386,7 @@
           <a:p>
             <a:fld id="{5FAEC70E-BD7A-C84E-BBB2-A6F04DF88CD6}" type="datetime1">
               <a:rPr lang="fr-FR" smtClean="0"/>
-              <a:t>12/11/2015</a:t>
+              <a:t>19/11/2015</a:t>
             </a:fld>
             <a:endParaRPr lang="fr-FR"/>
           </a:p>
@@ -1640,7 +1640,7 @@
           <a:p>
             <a:fld id="{A3E1B5F2-6384-AA48-811F-3B11712FF934}" type="datetime1">
               <a:rPr lang="fr-FR" smtClean="0"/>
-              <a:t>12/11/2015</a:t>
+              <a:t>19/11/2015</a:t>
             </a:fld>
             <a:endParaRPr lang="fr-FR"/>
           </a:p>
@@ -1936,7 +1936,7 @@
           <a:p>
             <a:fld id="{59A8CFBB-1DE6-C744-89C8-E6D57CED8A10}" type="datetime1">
               <a:rPr lang="fr-FR" smtClean="0"/>
-              <a:t>12/11/2015</a:t>
+              <a:t>19/11/2015</a:t>
             </a:fld>
             <a:endParaRPr lang="fr-FR"/>
           </a:p>
@@ -2366,7 +2366,7 @@
           <a:p>
             <a:fld id="{6C2F8A0C-51C3-D940-BE9D-5C8C507F5EB2}" type="datetime1">
               <a:rPr lang="fr-FR" smtClean="0"/>
-              <a:t>12/11/2015</a:t>
+              <a:t>19/11/2015</a:t>
             </a:fld>
             <a:endParaRPr lang="fr-FR"/>
           </a:p>
@@ -2492,7 +2492,7 @@
           <a:p>
             <a:fld id="{1474B01E-E1D8-2141-854E-B28AEB79A71C}" type="datetime1">
               <a:rPr lang="fr-FR" smtClean="0"/>
-              <a:t>12/11/2015</a:t>
+              <a:t>19/11/2015</a:t>
             </a:fld>
             <a:endParaRPr lang="fr-FR"/>
           </a:p>
@@ -2595,7 +2595,7 @@
           <a:p>
             <a:fld id="{1411AB96-EE40-AE4D-B803-8090FB775C59}" type="datetime1">
               <a:rPr lang="fr-FR" smtClean="0"/>
-              <a:t>12/11/2015</a:t>
+              <a:t>19/11/2015</a:t>
             </a:fld>
             <a:endParaRPr lang="fr-FR"/>
           </a:p>
@@ -2880,7 +2880,7 @@
           <a:p>
             <a:fld id="{4902E5C2-4F2E-7947-B55D-E6E7CCB6601A}" type="datetime1">
               <a:rPr lang="fr-FR" smtClean="0"/>
-              <a:t>12/11/2015</a:t>
+              <a:t>19/11/2015</a:t>
             </a:fld>
             <a:endParaRPr lang="fr-FR"/>
           </a:p>
@@ -3141,7 +3141,7 @@
           <a:p>
             <a:fld id="{5FBDED86-FF26-7149-A82E-CD9466969CB8}" type="datetime1">
               <a:rPr lang="fr-FR" smtClean="0"/>
-              <a:t>12/11/2015</a:t>
+              <a:t>19/11/2015</a:t>
             </a:fld>
             <a:endParaRPr lang="fr-FR"/>
           </a:p>
@@ -3362,7 +3362,7 @@
           <a:p>
             <a:fld id="{20A70C30-3957-4E40-889C-49A1A0F3A6D0}" type="datetime1">
               <a:rPr lang="fr-FR" smtClean="0"/>
-              <a:t>12/11/2015</a:t>
+              <a:t>19/11/2015</a:t>
             </a:fld>
             <a:endParaRPr lang="fr-FR"/>
           </a:p>
@@ -3789,7 +3789,19 @@
           <a:p>
             <a:r>
               <a:rPr lang="fr-FR" dirty="0" smtClean="0"/>
-              <a:t>V1.0 – 8th of </a:t>
+              <a:t>V1.1 </a:t>
+            </a:r>
+            <a:r>
+              <a:rPr lang="fr-FR" smtClean="0"/>
+              <a:t>– </a:t>
+            </a:r>
+            <a:r>
+              <a:rPr lang="fr-FR" smtClean="0"/>
+              <a:t>19th </a:t>
+            </a:r>
+            <a:r>
+              <a:rPr lang="fr-FR" dirty="0" smtClean="0"/>
+              <a:t>of </a:t>
             </a:r>
             <a:r>
               <a:rPr lang="fr-FR" dirty="0" err="1" smtClean="0"/>
@@ -3825,7 +3837,7 @@
           <a:p>
             <a:fld id="{931BA0ED-3995-4747-8D64-4EFA267CD4C2}" type="datetime1">
               <a:rPr lang="fr-FR" smtClean="0"/>
-              <a:t>12/11/2015</a:t>
+              <a:t>19/11/2015</a:t>
             </a:fld>
             <a:endParaRPr lang="fr-FR"/>
           </a:p>
@@ -3942,8 +3954,34 @@
           <a:lstStyle/>
           <a:p>
             <a:r>
-              <a:rPr lang="fr-FR" dirty="0" smtClean="0"/>
-              <a:t>Full tutorial on wiki:</a:t>
+              <a:rPr lang="fr-FR" sz="4200" dirty="0"/>
+              <a:t>Quick openETCS Tutorial in </a:t>
+            </a:r>
+            <a:r>
+              <a:rPr lang="fr-FR" sz="4200" dirty="0" err="1"/>
+              <a:t>next</a:t>
+            </a:r>
+            <a:r>
+              <a:rPr lang="fr-FR" sz="4200" dirty="0"/>
+              <a:t> </a:t>
+            </a:r>
+            <a:r>
+              <a:rPr lang="fr-FR" sz="4200" dirty="0" err="1"/>
+              <a:t>slides</a:t>
+            </a:r>
+            <a:endParaRPr lang="fr-FR" sz="4200" dirty="0"/>
+          </a:p>
+          <a:p>
+            <a:endParaRPr lang="fr-FR" sz="4200" dirty="0" smtClean="0"/>
+          </a:p>
+          <a:p>
+            <a:r>
+              <a:rPr lang="fr-FR" sz="4200" dirty="0" smtClean="0"/>
+              <a:t>Full </a:t>
+            </a:r>
+            <a:r>
+              <a:rPr lang="fr-FR" sz="4200" dirty="0" smtClean="0"/>
+              <a:t>tutorial on wiki:</a:t>
             </a:r>
           </a:p>
           <a:p>
@@ -3988,25 +4026,6 @@
           <a:p>
             <a:endParaRPr lang="fr-FR" dirty="0" smtClean="0"/>
           </a:p>
-          <a:p>
-            <a:r>
-              <a:rPr lang="fr-FR" dirty="0" smtClean="0"/>
-              <a:t>Quick openETCS Tutorial in </a:t>
-            </a:r>
-            <a:r>
-              <a:rPr lang="fr-FR" dirty="0" err="1" smtClean="0"/>
-              <a:t>next</a:t>
-            </a:r>
-            <a:r>
-              <a:rPr lang="fr-FR" dirty="0" smtClean="0"/>
-              <a:t> </a:t>
-            </a:r>
-            <a:r>
-              <a:rPr lang="fr-FR" dirty="0" err="1" smtClean="0"/>
-              <a:t>slides</a:t>
-            </a:r>
-            <a:endParaRPr lang="fr-FR" dirty="0"/>
-          </a:p>
         </p:txBody>
       </p:sp>
       <p:sp>
@@ -4026,7 +4045,7 @@
           <a:p>
             <a:fld id="{D053FD6A-4CC7-EF45-AB41-64109787680A}" type="datetime1">
               <a:rPr lang="fr-FR" smtClean="0"/>
-              <a:t>12/11/2015</a:t>
+              <a:t>19/11/2015</a:t>
             </a:fld>
             <a:endParaRPr lang="fr-FR"/>
           </a:p>
@@ -4151,7 +4170,15 @@
             </a:r>
             <a:r>
               <a:rPr lang="fr-FR" sz="2800" dirty="0"/>
-              <a:t> Eclipse</a:t>
+              <a:t> </a:t>
+            </a:r>
+            <a:r>
+              <a:rPr lang="fr-FR" sz="2800" dirty="0" smtClean="0"/>
+              <a:t>Eclipse </a:t>
+            </a:r>
+            <a:r>
+              <a:rPr lang="fr-FR" sz="2800" dirty="0" err="1" smtClean="0"/>
+              <a:t>platform</a:t>
             </a:r>
             <a:r>
               <a:rPr lang="fr-FR" sz="2800" dirty="0" smtClean="0"/>
@@ -4163,7 +4190,11 @@
             </a:r>
             <a:r>
               <a:rPr lang="fr-FR" sz="2800" dirty="0" smtClean="0"/>
-              <a:t> openETCS </a:t>
+              <a:t> </a:t>
+            </a:r>
+            <a:r>
+              <a:rPr lang="fr-FR" sz="2800" dirty="0" smtClean="0"/>
+              <a:t>a </a:t>
             </a:r>
             <a:r>
               <a:rPr lang="fr-FR" sz="2800" dirty="0" err="1" smtClean="0"/>
@@ -4171,13 +4202,18 @@
             </a:r>
             <a:r>
               <a:rPr lang="fr-FR" sz="2800" dirty="0" smtClean="0"/>
-              <a:t> </a:t>
-            </a:r>
-          </a:p>
-          <a:p>
+              <a:t> (for instance « openETCS »)</a:t>
+            </a:r>
+            <a:endParaRPr lang="fr-FR" sz="2800" dirty="0" smtClean="0"/>
+          </a:p>
+          <a:p>
+            <a:r>
+              <a:rPr lang="fr-FR" sz="2800" dirty="0"/>
+              <a:t>O</a:t>
+            </a:r>
             <a:r>
               <a:rPr lang="fr-FR" sz="2800" dirty="0" smtClean="0"/>
-              <a:t>open </a:t>
+              <a:t>pen </a:t>
             </a:r>
             <a:r>
               <a:rPr lang="fr-FR" sz="2800" dirty="0" err="1"/>
@@ -4359,7 +4395,7 @@
           <a:p>
             <a:fld id="{5FAEC70E-BD7A-C84E-BBB2-A6F04DF88CD6}" type="datetime1">
               <a:rPr lang="fr-FR" smtClean="0"/>
-              <a:t>12/11/2015</a:t>
+              <a:t>19/11/2015</a:t>
             </a:fld>
             <a:endParaRPr lang="fr-FR"/>
           </a:p>
@@ -4404,7 +4440,7 @@
         </p:blipFill>
         <p:spPr>
           <a:xfrm>
-            <a:off x="2951237" y="4774964"/>
+            <a:off x="3166160" y="5155964"/>
             <a:ext cx="2981788" cy="1302893"/>
           </a:xfrm>
           <a:prstGeom prst="rect">
@@ -4697,7 +4733,7 @@
           <a:p>
             <a:fld id="{76309974-C4F7-D647-978F-7550742E7D78}" type="datetime1">
               <a:rPr lang="fr-FR" smtClean="0"/>
-              <a:t>12/11/2015</a:t>
+              <a:t>19/11/2015</a:t>
             </a:fld>
             <a:endParaRPr lang="fr-FR"/>
           </a:p>
@@ -4898,7 +4934,7 @@
           <a:p>
             <a:fld id="{FB294DE3-1705-BA49-A562-2B3F63994DF3}" type="datetime1">
               <a:rPr lang="fr-FR" smtClean="0"/>
-              <a:t>12/11/2015</a:t>
+              <a:t>19/11/2015</a:t>
             </a:fld>
             <a:endParaRPr lang="fr-FR"/>
           </a:p>
@@ -5146,7 +5182,7 @@
           <a:p>
             <a:fld id="{9062B7D9-CB0B-694E-9EB8-45448D0D1A76}" type="datetime1">
               <a:rPr lang="fr-FR" smtClean="0"/>
-              <a:t>12/11/2015</a:t>
+              <a:t>19/11/2015</a:t>
             </a:fld>
             <a:endParaRPr lang="fr-FR"/>
           </a:p>
@@ -5291,7 +5327,7 @@
           <a:p>
             <a:fld id="{65349B9E-AE93-4C4B-9FC6-B0A2130D3DBD}" type="datetime1">
               <a:rPr lang="fr-FR" smtClean="0"/>
-              <a:t>12/11/2015</a:t>
+              <a:t>19/11/2015</a:t>
             </a:fld>
             <a:endParaRPr lang="fr-FR"/>
           </a:p>
@@ -5502,7 +5538,7 @@
           <a:p>
             <a:fld id="{74044B81-14A6-974C-9A01-535A71D5DC6E}" type="datetime1">
               <a:rPr lang="fr-FR" smtClean="0"/>
-              <a:t>12/11/2015</a:t>
+              <a:t>19/11/2015</a:t>
             </a:fld>
             <a:endParaRPr lang="fr-FR"/>
           </a:p>
@@ -5663,7 +5699,7 @@
           <a:p>
             <a:fld id="{6E617818-BD15-6440-88BB-1A212B67A353}" type="datetime1">
               <a:rPr lang="fr-FR" smtClean="0"/>
-              <a:t>12/11/2015</a:t>
+              <a:t>19/11/2015</a:t>
             </a:fld>
             <a:endParaRPr lang="fr-FR"/>
           </a:p>
@@ -5863,7 +5899,7 @@
           <a:p>
             <a:fld id="{C8B1640C-39B1-1D44-972E-3A68EE7DDC87}" type="datetime1">
               <a:rPr lang="fr-FR" smtClean="0"/>
-              <a:t>12/11/2015</a:t>
+              <a:t>19/11/2015</a:t>
             </a:fld>
             <a:endParaRPr lang="fr-FR"/>
           </a:p>
@@ -6270,7 +6306,7 @@
           <a:p>
             <a:fld id="{B8393D6F-7F96-7F48-AADB-ADA6C3046919}" type="datetime1">
               <a:rPr lang="fr-FR" smtClean="0"/>
-              <a:t>12/11/2015</a:t>
+              <a:t>19/11/2015</a:t>
             </a:fld>
             <a:endParaRPr lang="fr-FR"/>
           </a:p>
@@ -6385,7 +6421,7 @@
             </a:pPr>
             <a:r>
               <a:rPr lang="fr-FR" dirty="0" smtClean="0"/>
-              <a:t>ReqCycle installation (</a:t>
+              <a:t>ReqCycle installation </a:t>
             </a:r>
             <a:r>
               <a:rPr lang="fr-FR" dirty="0" err="1" smtClean="0"/>
@@ -6393,7 +6429,11 @@
             </a:r>
             <a:r>
               <a:rPr lang="fr-FR" dirty="0" smtClean="0"/>
-              <a:t> patchs) for modification of </a:t>
+              <a:t> patches for modification </a:t>
+            </a:r>
+            <a:r>
+              <a:rPr lang="fr-FR" dirty="0" smtClean="0"/>
+              <a:t>of </a:t>
             </a:r>
             <a:r>
               <a:rPr lang="fr-FR" dirty="0" err="1" smtClean="0"/>
@@ -6514,7 +6554,7 @@
           <a:p>
             <a:fld id="{5FAEC70E-BD7A-C84E-BBB2-A6F04DF88CD6}" type="datetime1">
               <a:rPr lang="fr-FR" smtClean="0"/>
-              <a:t>12/11/2015</a:t>
+              <a:t>19/11/2015</a:t>
             </a:fld>
             <a:endParaRPr lang="fr-FR"/>
           </a:p>
@@ -6772,7 +6812,7 @@
           <a:p>
             <a:fld id="{A983BED7-3CE8-5445-9F10-880FE77D0A8A}" type="datetime1">
               <a:rPr lang="fr-FR" smtClean="0"/>
-              <a:t>12/11/2015</a:t>
+              <a:t>19/11/2015</a:t>
             </a:fld>
             <a:endParaRPr lang="fr-FR"/>
           </a:p>
@@ -7072,7 +7112,7 @@
           <a:p>
             <a:fld id="{5FAEC70E-BD7A-C84E-BBB2-A6F04DF88CD6}" type="datetime1">
               <a:rPr lang="fr-FR" smtClean="0"/>
-              <a:t>12/11/2015</a:t>
+              <a:t>19/11/2015</a:t>
             </a:fld>
             <a:endParaRPr lang="fr-FR"/>
           </a:p>
@@ -7337,7 +7377,7 @@
           <a:p>
             <a:fld id="{062BC1FB-D1C0-D747-8D2F-B5DDBADEE4B9}" type="datetime1">
               <a:rPr lang="fr-FR" smtClean="0"/>
-              <a:t>12/11/2015</a:t>
+              <a:t>19/11/2015</a:t>
             </a:fld>
             <a:endParaRPr lang="fr-FR"/>
           </a:p>
@@ -7636,7 +7676,7 @@
           <a:p>
             <a:fld id="{26F1154D-8A10-254C-A651-5AB85C1F60B8}" type="datetime1">
               <a:rPr lang="fr-FR" smtClean="0"/>
-              <a:t>12/11/2015</a:t>
+              <a:t>19/11/2015</a:t>
             </a:fld>
             <a:endParaRPr lang="fr-FR"/>
           </a:p>
@@ -7905,7 +7945,7 @@
           <a:p>
             <a:fld id="{B12139B0-5524-B944-8CED-1C9CACAE70ED}" type="datetime1">
               <a:rPr lang="fr-FR" smtClean="0"/>
-              <a:t>12/11/2015</a:t>
+              <a:t>19/11/2015</a:t>
             </a:fld>
             <a:endParaRPr lang="fr-FR" dirty="0"/>
           </a:p>
@@ -8089,7 +8129,7 @@
           <a:p>
             <a:fld id="{D053FD6A-4CC7-EF45-AB41-64109787680A}" type="datetime1">
               <a:rPr lang="fr-FR" smtClean="0"/>
-              <a:t>12/11/2015</a:t>
+              <a:t>19/11/2015</a:t>
             </a:fld>
             <a:endParaRPr lang="fr-FR"/>
           </a:p>
@@ -8524,7 +8564,7 @@
           <a:p>
             <a:fld id="{5FAEC70E-BD7A-C84E-BBB2-A6F04DF88CD6}" type="datetime1">
               <a:rPr lang="fr-FR" smtClean="0"/>
-              <a:t>12/11/2015</a:t>
+              <a:t>19/11/2015</a:t>
             </a:fld>
             <a:endParaRPr lang="fr-FR"/>
           </a:p>
@@ -8657,7 +8697,7 @@
           <a:p>
             <a:fld id="{D053FD6A-4CC7-EF45-AB41-64109787680A}" type="datetime1">
               <a:rPr lang="fr-FR" smtClean="0"/>
-              <a:t>12/11/2015</a:t>
+              <a:t>19/11/2015</a:t>
             </a:fld>
             <a:endParaRPr lang="fr-FR"/>
           </a:p>
@@ -9021,7 +9061,7 @@
           <a:p>
             <a:fld id="{5FAEC70E-BD7A-C84E-BBB2-A6F04DF88CD6}" type="datetime1">
               <a:rPr lang="fr-FR" smtClean="0"/>
-              <a:t>12/11/2015</a:t>
+              <a:t>19/11/2015</a:t>
             </a:fld>
             <a:endParaRPr lang="fr-FR"/>
           </a:p>
@@ -9150,7 +9190,7 @@
           <a:p>
             <a:fld id="{D053FD6A-4CC7-EF45-AB41-64109787680A}" type="datetime1">
               <a:rPr lang="fr-FR" smtClean="0"/>
-              <a:t>12/11/2015</a:t>
+              <a:t>19/11/2015</a:t>
             </a:fld>
             <a:endParaRPr lang="fr-FR"/>
           </a:p>
@@ -9226,7 +9266,7 @@
           <a:p>
             <a:r>
               <a:rPr lang="fr-FR" dirty="0" smtClean="0"/>
-              <a:t>Installation part</a:t>
+              <a:t>1. ReqCycle installation</a:t>
             </a:r>
             <a:endParaRPr lang="fr-FR" dirty="0"/>
           </a:p>
@@ -9268,7 +9308,7 @@
           <a:p>
             <a:fld id="{D053FD6A-4CC7-EF45-AB41-64109787680A}" type="datetime1">
               <a:rPr lang="fr-FR" smtClean="0"/>
-              <a:t>12/11/2015</a:t>
+              <a:t>19/11/2015</a:t>
             </a:fld>
             <a:endParaRPr lang="fr-FR"/>
           </a:p>
@@ -9406,7 +9446,7 @@
           <a:p>
             <a:fld id="{D053FD6A-4CC7-EF45-AB41-64109787680A}" type="datetime1">
               <a:rPr lang="fr-FR" smtClean="0"/>
-              <a:t>12/11/2015</a:t>
+              <a:t>19/11/2015</a:t>
             </a:fld>
             <a:endParaRPr lang="fr-FR"/>
           </a:p>
@@ -9653,7 +9693,7 @@
           <a:p>
             <a:fld id="{5FAEC70E-BD7A-C84E-BBB2-A6F04DF88CD6}" type="datetime1">
               <a:rPr lang="fr-FR" smtClean="0"/>
-              <a:t>12/11/2015</a:t>
+              <a:t>19/11/2015</a:t>
             </a:fld>
             <a:endParaRPr lang="fr-FR"/>
           </a:p>
@@ -9778,7 +9818,7 @@
           <a:p>
             <a:fld id="{5FAEC70E-BD7A-C84E-BBB2-A6F04DF88CD6}" type="datetime1">
               <a:rPr lang="fr-FR" smtClean="0"/>
-              <a:t>12/11/2015</a:t>
+              <a:t>19/11/2015</a:t>
             </a:fld>
             <a:endParaRPr lang="fr-FR"/>
           </a:p>
@@ -9863,11 +9903,7 @@
           <a:p>
             <a:r>
               <a:rPr lang="fr-FR" dirty="0" smtClean="0"/>
-              <a:t>ReqCycle 0.8.0 </a:t>
-            </a:r>
-            <a:r>
-              <a:rPr lang="fr-FR" dirty="0" smtClean="0"/>
-              <a:t>openETCS installation</a:t>
+              <a:t>ReqCycle 0.8.0 openETCS installation</a:t>
             </a:r>
             <a:endParaRPr lang="fr-FR" dirty="0"/>
           </a:p>
@@ -10247,7 +10283,7 @@
           <a:p>
             <a:fld id="{5FAEC70E-BD7A-C84E-BBB2-A6F04DF88CD6}" type="datetime1">
               <a:rPr lang="fr-FR" smtClean="0"/>
-              <a:t>12/11/2015</a:t>
+              <a:t>19/11/2015</a:t>
             </a:fld>
             <a:endParaRPr lang="fr-FR"/>
           </a:p>
@@ -10373,7 +10409,7 @@
           <a:p>
             <a:fld id="{D053FD6A-4CC7-EF45-AB41-64109787680A}" type="datetime1">
               <a:rPr lang="fr-FR" smtClean="0"/>
-              <a:t>12/11/2015</a:t>
+              <a:t>19/11/2015</a:t>
             </a:fld>
             <a:endParaRPr lang="fr-FR"/>
           </a:p>
@@ -10653,7 +10689,51 @@
             </a:r>
             <a:r>
               <a:rPr lang="fr-FR" sz="2400" dirty="0" smtClean="0"/>
-              <a:t> (8)</a:t>
+              <a:t> </a:t>
+            </a:r>
+            <a:r>
+              <a:rPr lang="fr-FR" sz="2400" dirty="0" smtClean="0"/>
+              <a:t> to </a:t>
+            </a:r>
+            <a:r>
+              <a:rPr lang="fr-FR" sz="2400" dirty="0" err="1" smtClean="0"/>
+              <a:t>perform</a:t>
+            </a:r>
+            <a:r>
+              <a:rPr lang="fr-FR" sz="2400" dirty="0" smtClean="0"/>
+              <a:t> import  – </a:t>
+            </a:r>
+            <a:r>
+              <a:rPr lang="fr-FR" sz="2400" dirty="0" err="1" smtClean="0"/>
+              <a:t>presentation</a:t>
+            </a:r>
+            <a:r>
+              <a:rPr lang="fr-FR" sz="2400" dirty="0" smtClean="0"/>
+              <a:t> of configuration </a:t>
+            </a:r>
+            <a:r>
+              <a:rPr lang="fr-FR" sz="2400" dirty="0" err="1" smtClean="0"/>
+              <a:t>is</a:t>
+            </a:r>
+            <a:r>
+              <a:rPr lang="fr-FR" sz="2400" dirty="0" smtClean="0"/>
+              <a:t> </a:t>
+            </a:r>
+            <a:r>
+              <a:rPr lang="fr-FR" sz="2400" dirty="0" err="1" smtClean="0"/>
+              <a:t>shown</a:t>
+            </a:r>
+            <a:r>
+              <a:rPr lang="fr-FR" sz="2400" dirty="0" smtClean="0"/>
+              <a:t> in </a:t>
+            </a:r>
+            <a:r>
+              <a:rPr lang="fr-FR" sz="2400" dirty="0" err="1" smtClean="0"/>
+              <a:t>slides</a:t>
+            </a:r>
+            <a:r>
+              <a:rPr lang="fr-FR" sz="2400" dirty="0" smtClean="0"/>
+              <a:t> 8 and 9</a:t>
             </a:r>
             <a:endParaRPr lang="fr-FR" sz="2400" dirty="0"/>
           </a:p>
@@ -10672,11 +10752,23 @@
             </a:r>
             <a:r>
               <a:rPr lang="fr-FR" sz="2400" dirty="0" err="1" smtClean="0"/>
+              <a:t>your</a:t>
+            </a:r>
+            <a:r>
+              <a:rPr lang="fr-FR" sz="2400" dirty="0" smtClean="0"/>
+              <a:t> </a:t>
+            </a:r>
+            <a:r>
+              <a:rPr lang="fr-FR" sz="2400" dirty="0" err="1" smtClean="0"/>
               <a:t>own</a:t>
             </a:r>
             <a:r>
               <a:rPr lang="fr-FR" sz="2400" dirty="0" smtClean="0"/>
-              <a:t> configuration: </a:t>
+              <a:t> </a:t>
+            </a:r>
+            <a:r>
+              <a:rPr lang="fr-FR" sz="2400" dirty="0" smtClean="0"/>
+              <a:t>configuration: </a:t>
             </a:r>
             <a:r>
               <a:rPr lang="fr-FR" sz="2400" dirty="0" err="1" smtClean="0"/>
@@ -10703,11 +10795,27 @@
               <a:t> in </a:t>
             </a:r>
             <a:r>
+              <a:rPr lang="fr-FR" sz="2400" dirty="0" smtClean="0"/>
+              <a:t>ReqCycle wiki </a:t>
+            </a:r>
+            <a:r>
               <a:rPr lang="fr-FR" sz="2400" dirty="0"/>
-              <a:t>wiki tutorial </a:t>
-            </a:r>
-            <a:r>
-              <a:rPr lang="fr-FR" sz="1400" dirty="0" smtClean="0">
+              <a:t>tutorial </a:t>
+            </a:r>
+            <a:r>
+              <a:rPr lang="fr-FR" sz="2400" dirty="0" err="1" smtClean="0"/>
+              <a:t>available</a:t>
+            </a:r>
+            <a:r>
+              <a:rPr lang="fr-FR" sz="2400" dirty="0" smtClean="0"/>
+              <a:t> </a:t>
+            </a:r>
+            <a:r>
+              <a:rPr lang="fr-FR" sz="2400" dirty="0" err="1" smtClean="0"/>
+              <a:t>here:</a:t>
+            </a:r>
+            <a:r>
+              <a:rPr lang="fr-FR" sz="1400" dirty="0" err="1" smtClean="0">
                 <a:hlinkClick r:id="rId2"/>
               </a:rPr>
               <a:t>https</a:t>
@@ -10735,23 +10843,7 @@
             </a:pPr>
             <a:r>
               <a:rPr lang="fr-FR" sz="2400" dirty="0" smtClean="0"/>
-              <a:t>	and </a:t>
-            </a:r>
-            <a:r>
-              <a:rPr lang="fr-FR" sz="2400" dirty="0" err="1" smtClean="0"/>
-              <a:t>illustrated</a:t>
-            </a:r>
-            <a:r>
-              <a:rPr lang="fr-FR" sz="2400" dirty="0" smtClean="0"/>
-              <a:t> on openETCS in </a:t>
-            </a:r>
-            <a:r>
-              <a:rPr lang="fr-FR" sz="2400" dirty="0" err="1" smtClean="0"/>
-              <a:t>slides</a:t>
-            </a:r>
-            <a:r>
-              <a:rPr lang="fr-FR" sz="2400" dirty="0" smtClean="0"/>
-              <a:t> 9 to 11</a:t>
+              <a:t>	</a:t>
             </a:r>
           </a:p>
         </p:txBody>
@@ -10773,7 +10865,7 @@
           <a:p>
             <a:fld id="{5FAEC70E-BD7A-C84E-BBB2-A6F04DF88CD6}" type="datetime1">
               <a:rPr lang="fr-FR" smtClean="0"/>
-              <a:t>12/11/2015</a:t>
+              <a:t>19/11/2015</a:t>
             </a:fld>
             <a:endParaRPr lang="fr-FR"/>
           </a:p>
@@ -10957,7 +11049,7 @@
           <a:p>
             <a:fld id="{5FAEC70E-BD7A-C84E-BBB2-A6F04DF88CD6}" type="datetime1">
               <a:rPr lang="fr-FR" smtClean="0"/>
-              <a:t>12/11/2015</a:t>
+              <a:t>19/11/2015</a:t>
             </a:fld>
             <a:endParaRPr lang="fr-FR"/>
           </a:p>
@@ -11153,7 +11245,7 @@
           <a:p>
             <a:fld id="{F4335CCC-D631-7E4D-A7CC-111A809CA31E}" type="datetime1">
               <a:rPr lang="fr-FR" smtClean="0"/>
-              <a:t>12/11/2015</a:t>
+              <a:t>19/11/2015</a:t>
             </a:fld>
             <a:endParaRPr lang="fr-FR"/>
           </a:p>
@@ -11398,14 +11490,24 @@
         </p:nvSpPr>
         <p:spPr/>
         <p:txBody>
-          <a:bodyPr/>
-          <a:lstStyle/>
-          <a:p>
-            <a:r>
-              <a:rPr lang="fr-FR" dirty="0" smtClean="0"/>
-              <a:t>ReqCycle OpenETCS configuration</a:t>
-            </a:r>
-            <a:endParaRPr lang="fr-FR" dirty="0"/>
+          <a:bodyPr>
+            <a:noAutofit/>
+          </a:bodyPr>
+          <a:lstStyle/>
+          <a:p>
+            <a:r>
+              <a:rPr lang="fr-FR" sz="3200" dirty="0"/>
+              <a:t>ReqCycle OpenETCS </a:t>
+            </a:r>
+            <a:r>
+              <a:rPr lang="fr-FR" sz="3200" dirty="0" err="1"/>
+              <a:t>illustrated</a:t>
+            </a:r>
+            <a:r>
+              <a:rPr lang="fr-FR" sz="3200" dirty="0"/>
+              <a:t> configuration</a:t>
+            </a:r>
+            <a:endParaRPr lang="fr-FR" sz="3200" dirty="0"/>
           </a:p>
         </p:txBody>
       </p:sp>
@@ -11450,7 +11552,7 @@
           <a:p>
             <a:fld id="{4FDD3FE7-4BE0-AC4F-9F41-B03702F84959}" type="datetime1">
               <a:rPr lang="fr-FR" smtClean="0"/>
-              <a:t>12/11/2015</a:t>
+              <a:t>19/11/2015</a:t>
             </a:fld>
             <a:endParaRPr lang="fr-FR"/>
           </a:p>

</xml_diff>

<commit_message>
updated figures and detailed explanations after feedback from Jan
</commit_message>
<xml_diff>
--- a/T7.3/TraceabilityArchitecture/reqCycleUse/ReqCyclePossibleUseForArchitectureVerification-V2.pptx
+++ b/T7.3/TraceabilityArchitecture/reqCycleUse/ReqCyclePossibleUseForArchitectureVerification-V2.pptx
@@ -3793,11 +3793,7 @@
             </a:r>
             <a:r>
               <a:rPr lang="fr-FR" smtClean="0"/>
-              <a:t>– </a:t>
-            </a:r>
-            <a:r>
-              <a:rPr lang="fr-FR" smtClean="0"/>
-              <a:t>19th </a:t>
+              <a:t>– 19th </a:t>
             </a:r>
             <a:r>
               <a:rPr lang="fr-FR" dirty="0" smtClean="0"/>
@@ -3977,11 +3973,7 @@
           <a:p>
             <a:r>
               <a:rPr lang="fr-FR" sz="4200" dirty="0" smtClean="0"/>
-              <a:t>Full </a:t>
-            </a:r>
-            <a:r>
-              <a:rPr lang="fr-FR" sz="4200" dirty="0" smtClean="0"/>
-              <a:t>tutorial on wiki:</a:t>
+              <a:t>Full tutorial on wiki:</a:t>
             </a:r>
           </a:p>
           <a:p>
@@ -4190,11 +4182,7 @@
             </a:r>
             <a:r>
               <a:rPr lang="fr-FR" sz="2800" dirty="0" smtClean="0"/>
-              <a:t> </a:t>
-            </a:r>
-            <a:r>
-              <a:rPr lang="fr-FR" sz="2800" dirty="0" smtClean="0"/>
-              <a:t>a </a:t>
+              <a:t> a </a:t>
             </a:r>
             <a:r>
               <a:rPr lang="fr-FR" sz="2800" dirty="0" err="1" smtClean="0"/>
@@ -4204,7 +4192,6 @@
               <a:rPr lang="fr-FR" sz="2800" dirty="0" smtClean="0"/>
               <a:t> (for instance « openETCS »)</a:t>
             </a:r>
-            <a:endParaRPr lang="fr-FR" sz="2800" dirty="0" smtClean="0"/>
           </a:p>
           <a:p>
             <a:r>
@@ -4216,12 +4203,12 @@
               <a:t>pen </a:t>
             </a:r>
             <a:r>
-              <a:rPr lang="fr-FR" sz="2800" dirty="0" err="1"/>
-              <a:t>Reqcycle</a:t>
+              <a:rPr lang="fr-FR" sz="2800" dirty="0" smtClean="0"/>
+              <a:t>ReqCycle </a:t>
             </a:r>
             <a:r>
               <a:rPr lang="fr-FR" sz="2800" dirty="0"/>
-              <a:t> perspective </a:t>
+              <a:t>perspective </a:t>
             </a:r>
             <a:endParaRPr lang="fr-FR" sz="2800" dirty="0" smtClean="0"/>
           </a:p>
@@ -4243,12 +4230,12 @@
               <a:t>« </a:t>
             </a:r>
             <a:r>
-              <a:rPr lang="fr-FR" sz="2800" dirty="0" err="1" smtClean="0"/>
-              <a:t>Rererence</a:t>
-            </a:r>
-            <a:r>
               <a:rPr lang="fr-FR" sz="2800" dirty="0" smtClean="0"/>
-              <a:t> requirements</a:t>
+              <a:t>Reference </a:t>
+            </a:r>
+            <a:r>
+              <a:rPr lang="fr-FR" sz="2800" dirty="0" smtClean="0"/>
+              <a:t>requirements</a:t>
             </a:r>
             <a:r>
               <a:rPr lang="fr-FR" sz="2800" dirty="0"/>
@@ -5098,46 +5085,119 @@
             <p:ph type="title"/>
           </p:nvPr>
         </p:nvSpPr>
-        <p:spPr/>
+        <p:spPr>
+          <a:xfrm>
+            <a:off x="194357" y="274638"/>
+            <a:ext cx="8798053" cy="1143000"/>
+          </a:xfrm>
+        </p:spPr>
         <p:txBody>
           <a:bodyPr>
-            <a:normAutofit/>
+            <a:noAutofit/>
           </a:bodyPr>
           <a:lstStyle/>
           <a:p>
             <a:r>
-              <a:rPr lang="fr-FR" sz="3600" dirty="0" smtClean="0"/>
-              <a:t>Open </a:t>
-            </a:r>
-            <a:r>
-              <a:rPr lang="fr-FR" sz="3600" dirty="0" err="1" smtClean="0"/>
+              <a:rPr lang="fr-FR" sz="2800" dirty="0" err="1" smtClean="0"/>
+              <a:t>Load</a:t>
+            </a:r>
+            <a:r>
+              <a:rPr lang="fr-FR" sz="2800" dirty="0" smtClean="0"/>
+              <a:t> </a:t>
+            </a:r>
+            <a:r>
+              <a:rPr lang="fr-FR" sz="2800" dirty="0" err="1" smtClean="0"/>
               <a:t>requirement</a:t>
             </a:r>
             <a:r>
-              <a:rPr lang="fr-FR" sz="3600" dirty="0" smtClean="0"/>
+              <a:rPr lang="fr-FR" sz="2800" dirty="0" smtClean="0"/>
               <a:t> </a:t>
             </a:r>
             <a:r>
-              <a:rPr lang="fr-FR" sz="3600" dirty="0" err="1" smtClean="0"/>
+              <a:rPr lang="fr-FR" sz="2800" dirty="0" err="1" smtClean="0"/>
               <a:t>view</a:t>
             </a:r>
             <a:r>
-              <a:rPr lang="fr-FR" sz="3600" dirty="0" smtClean="0"/>
-              <a:t> and </a:t>
-            </a:r>
-            <a:r>
-              <a:rPr lang="fr-FR" sz="3600" dirty="0" err="1" smtClean="0"/>
+              <a:rPr lang="fr-FR" sz="2800" dirty="0" smtClean="0"/>
+              <a:t> </a:t>
+            </a:r>
+            <a:r>
+              <a:rPr lang="fr-FR" sz="2800" dirty="0" err="1" smtClean="0"/>
+              <a:t>with</a:t>
+            </a:r>
+            <a:r>
+              <a:rPr lang="fr-FR" sz="2800" dirty="0" smtClean="0"/>
+              <a:t> </a:t>
+            </a:r>
+            <a:r>
+              <a:rPr lang="fr-FR" sz="2800" dirty="0" err="1" smtClean="0"/>
+              <a:t>requirement</a:t>
+            </a:r>
+            <a:r>
+              <a:rPr lang="fr-FR" sz="2800" dirty="0" smtClean="0"/>
+              <a:t> source (click on « </a:t>
+            </a:r>
+            <a:r>
+              <a:rPr lang="fr-FR" sz="2800" dirty="0" err="1" smtClean="0"/>
+              <a:t>database</a:t>
+            </a:r>
+            <a:r>
+              <a:rPr lang="fr-FR" sz="2800" dirty="0" smtClean="0"/>
+              <a:t> » </a:t>
+            </a:r>
+            <a:r>
+              <a:rPr lang="fr-FR" sz="2800" dirty="0" err="1" smtClean="0"/>
+              <a:t>icon</a:t>
+            </a:r>
+            <a:r>
+              <a:rPr lang="fr-FR" sz="2800" dirty="0" smtClean="0"/>
+              <a:t> and select </a:t>
+            </a:r>
+            <a:r>
+              <a:rPr lang="fr-FR" sz="2800" dirty="0" err="1" smtClean="0"/>
+              <a:t>chapter</a:t>
+            </a:r>
+            <a:r>
+              <a:rPr lang="fr-FR" sz="2800" dirty="0" smtClean="0"/>
+              <a:t> </a:t>
+            </a:r>
+            <a:r>
+              <a:rPr lang="fr-FR" sz="2800" dirty="0" err="1" smtClean="0"/>
+              <a:t>you</a:t>
+            </a:r>
+            <a:r>
+              <a:rPr lang="fr-FR" sz="2800" dirty="0" smtClean="0"/>
+              <a:t> </a:t>
+            </a:r>
+            <a:r>
+              <a:rPr lang="fr-FR" sz="2800" dirty="0" err="1" smtClean="0"/>
+              <a:t>want</a:t>
+            </a:r>
+            <a:r>
+              <a:rPr lang="fr-FR" sz="2800" dirty="0" smtClean="0"/>
+              <a:t> to trace) and </a:t>
+            </a:r>
+            <a:r>
+              <a:rPr lang="fr-FR" sz="2800" dirty="0" err="1" smtClean="0"/>
+              <a:t>then</a:t>
+            </a:r>
+            <a:r>
+              <a:rPr lang="fr-FR" sz="2800" dirty="0" smtClean="0"/>
+              <a:t> </a:t>
+            </a:r>
+            <a:r>
+              <a:rPr lang="fr-FR" sz="2800" dirty="0" err="1" smtClean="0"/>
               <a:t>expand</a:t>
             </a:r>
             <a:r>
-              <a:rPr lang="fr-FR" sz="3600" dirty="0" smtClean="0"/>
+              <a:rPr lang="fr-FR" sz="2800" dirty="0" smtClean="0"/>
               <a:t> </a:t>
             </a:r>
             <a:r>
-              <a:rPr lang="fr-FR" sz="3600" dirty="0" err="1" smtClean="0"/>
+              <a:rPr lang="fr-FR" sz="2800" dirty="0" err="1" smtClean="0"/>
               <a:t>nodes</a:t>
             </a:r>
-            <a:endParaRPr lang="fr-FR" sz="3600" dirty="0"/>
+            <a:endParaRPr lang="fr-FR" sz="2800" dirty="0"/>
           </a:p>
         </p:txBody>
       </p:sp>
@@ -5157,12 +5217,17 @@
         </p:blipFill>
         <p:spPr>
           <a:xfrm>
-            <a:off x="1585475" y="1354668"/>
-            <a:ext cx="6164865" cy="5279570"/>
+            <a:off x="3370228" y="1590793"/>
+            <a:ext cx="5622182" cy="4814818"/>
           </a:xfrm>
           <a:prstGeom prst="rect">
             <a:avLst/>
           </a:prstGeom>
+          <a:ln>
+            <a:solidFill>
+              <a:srgbClr val="0000FF"/>
+            </a:solidFill>
+          </a:ln>
         </p:spPr>
       </p:pic>
       <p:sp>
@@ -5211,6 +5276,94 @@
           </a:p>
         </p:txBody>
       </p:sp>
+      <p:grpSp>
+        <p:nvGrpSpPr>
+          <p:cNvPr id="6" name="Grouper 5"/>
+          <p:cNvGrpSpPr/>
+          <p:nvPr/>
+        </p:nvGrpSpPr>
+        <p:grpSpPr>
+          <a:xfrm>
+            <a:off x="194357" y="1676415"/>
+            <a:ext cx="2948106" cy="1751773"/>
+            <a:chOff x="194357" y="1417638"/>
+            <a:chExt cx="2948106" cy="1751773"/>
+          </a:xfrm>
+        </p:grpSpPr>
+        <p:pic>
+          <p:nvPicPr>
+            <p:cNvPr id="3" name="Image 2"/>
+            <p:cNvPicPr>
+              <a:picLocks noChangeAspect="1"/>
+            </p:cNvPicPr>
+            <p:nvPr/>
+          </p:nvPicPr>
+          <p:blipFill>
+            <a:blip r:embed="rId3"/>
+            <a:stretch>
+              <a:fillRect/>
+            </a:stretch>
+          </p:blipFill>
+          <p:spPr>
+            <a:xfrm>
+              <a:off x="194357" y="1417638"/>
+              <a:ext cx="2948106" cy="1751773"/>
+            </a:xfrm>
+            <a:prstGeom prst="rect">
+              <a:avLst/>
+            </a:prstGeom>
+            <a:ln>
+              <a:solidFill>
+                <a:srgbClr val="0000FF"/>
+              </a:solidFill>
+            </a:ln>
+          </p:spPr>
+        </p:pic>
+        <p:sp>
+          <p:nvSpPr>
+            <p:cNvPr id="8" name="Rectangle à coins arrondis 7"/>
+            <p:cNvSpPr/>
+            <p:nvPr/>
+          </p:nvSpPr>
+          <p:spPr>
+            <a:xfrm>
+              <a:off x="2373085" y="1579168"/>
+              <a:ext cx="217715" cy="211667"/>
+            </a:xfrm>
+            <a:prstGeom prst="roundRect">
+              <a:avLst/>
+            </a:prstGeom>
+            <a:noFill/>
+            <a:ln w="38100" cmpd="sng">
+              <a:solidFill>
+                <a:srgbClr val="0000FF"/>
+              </a:solidFill>
+            </a:ln>
+          </p:spPr>
+          <p:style>
+            <a:lnRef idx="1">
+              <a:schemeClr val="accent1"/>
+            </a:lnRef>
+            <a:fillRef idx="3">
+              <a:schemeClr val="accent1"/>
+            </a:fillRef>
+            <a:effectRef idx="2">
+              <a:schemeClr val="accent1"/>
+            </a:effectRef>
+            <a:fontRef idx="minor">
+              <a:schemeClr val="lt1"/>
+            </a:fontRef>
+          </p:style>
+          <p:txBody>
+            <a:bodyPr rtlCol="0" anchor="ctr"/>
+            <a:lstStyle/>
+            <a:p>
+              <a:pPr algn="ctr"/>
+              <a:endParaRPr lang="fr-FR"/>
+            </a:p>
+          </p:txBody>
+        </p:sp>
+      </p:grpSp>
     </p:spTree>
     <p:extLst>
       <p:ext uri="{BB962C8B-B14F-4D97-AF65-F5344CB8AC3E}">
@@ -5403,38 +5556,171 @@
             <p:ph type="title"/>
           </p:nvPr>
         </p:nvSpPr>
-        <p:spPr/>
+        <p:spPr>
+          <a:xfrm>
+            <a:off x="457199" y="274638"/>
+            <a:ext cx="8329277" cy="1670488"/>
+          </a:xfrm>
+        </p:spPr>
         <p:txBody>
           <a:bodyPr>
-            <a:normAutofit fontScale="90000"/>
+            <a:noAutofit/>
           </a:bodyPr>
           <a:lstStyle/>
           <a:p>
             <a:r>
-              <a:rPr lang="fr-FR" dirty="0" err="1" smtClean="0"/>
+              <a:rPr lang="fr-FR" sz="2800" dirty="0" err="1" smtClean="0"/>
               <a:t>Load</a:t>
             </a:r>
             <a:r>
-              <a:rPr lang="fr-FR" dirty="0" smtClean="0"/>
-              <a:t> ETCS papyrus SysML model (do not care of </a:t>
-            </a:r>
-            <a:r>
-              <a:rPr lang="fr-FR" dirty="0" err="1" smtClean="0"/>
+              <a:rPr lang="fr-FR" sz="2800" dirty="0" smtClean="0"/>
+              <a:t> ETCS papyrus SysML model </a:t>
+            </a:r>
+            <a:r>
+              <a:rPr lang="fr-FR" sz="2800" dirty="0" smtClean="0"/>
+              <a:t>(in </a:t>
+            </a:r>
+            <a:r>
+              <a:rPr lang="fr-FR" sz="2800" dirty="0" err="1" smtClean="0"/>
+              <a:t>project</a:t>
+            </a:r>
+            <a:r>
+              <a:rPr lang="fr-FR" sz="2800" dirty="0" smtClean="0"/>
+              <a:t> explorer </a:t>
+            </a:r>
+            <a:r>
+              <a:rPr lang="fr-FR" sz="2800" dirty="0" err="1" smtClean="0"/>
+              <a:t>view</a:t>
+            </a:r>
+            <a:r>
+              <a:rPr lang="fr-FR" sz="2800" dirty="0" smtClean="0"/>
+              <a:t>, double click on </a:t>
+            </a:r>
+            <a:r>
+              <a:rPr lang="fr-FR" sz="2800" dirty="0" err="1" smtClean="0"/>
+              <a:t>openETCS_EVC</a:t>
+            </a:r>
+            <a:r>
+              <a:rPr lang="fr-FR" sz="2800" dirty="0" smtClean="0"/>
+              <a:t> </a:t>
+            </a:r>
+            <a:r>
+              <a:rPr lang="fr-FR" sz="2800" dirty="0" err="1" smtClean="0"/>
+              <a:t>element</a:t>
+            </a:r>
+            <a:r>
+              <a:rPr lang="fr-FR" sz="2800" dirty="0" smtClean="0"/>
+              <a:t> </a:t>
+            </a:r>
+            <a:r>
+              <a:rPr lang="fr-FR" sz="2800" dirty="0" err="1" smtClean="0"/>
+              <a:t>with</a:t>
+            </a:r>
+            <a:r>
+              <a:rPr lang="fr-FR" sz="2800" dirty="0" smtClean="0"/>
+              <a:t> Papyrus </a:t>
+            </a:r>
+            <a:r>
+              <a:rPr lang="fr-FR" sz="2800" dirty="0" err="1" smtClean="0"/>
+              <a:t>icon</a:t>
+            </a:r>
+            <a:r>
+              <a:rPr lang="fr-FR" sz="2800" dirty="0" smtClean="0"/>
+              <a:t>) and click « cancel » on the first </a:t>
+            </a:r>
+            <a:r>
+              <a:rPr lang="fr-FR" sz="2800" dirty="0" err="1" smtClean="0"/>
+              <a:t>popup</a:t>
+            </a:r>
+            <a:r>
+              <a:rPr lang="fr-FR" sz="2800" dirty="0" smtClean="0"/>
+              <a:t> </a:t>
+            </a:r>
+            <a:r>
+              <a:rPr lang="fr-FR" sz="2800" dirty="0" err="1" smtClean="0"/>
+              <a:t>windows</a:t>
+            </a:r>
+            <a:r>
+              <a:rPr lang="fr-FR" sz="2800" dirty="0" smtClean="0"/>
+              <a:t> </a:t>
+            </a:r>
+            <a:r>
+              <a:rPr lang="fr-FR" sz="2800" dirty="0" err="1" smtClean="0"/>
+              <a:t>that</a:t>
+            </a:r>
+            <a:r>
+              <a:rPr lang="fr-FR" sz="2800" dirty="0" smtClean="0"/>
+              <a:t> </a:t>
+            </a:r>
+            <a:r>
+              <a:rPr lang="fr-FR" sz="2800" dirty="0" err="1" smtClean="0"/>
+              <a:t>is</a:t>
+            </a:r>
+            <a:r>
+              <a:rPr lang="fr-FR" sz="2800" dirty="0" smtClean="0"/>
+              <a:t> </a:t>
+            </a:r>
+            <a:r>
+              <a:rPr lang="fr-FR" sz="2800" dirty="0" err="1" smtClean="0"/>
+              <a:t>displayed</a:t>
+            </a:r>
+            <a:r>
+              <a:rPr lang="fr-FR" sz="2800" dirty="0" smtClean="0"/>
+              <a:t> about </a:t>
+            </a:r>
+            <a:r>
+              <a:rPr lang="fr-FR" sz="2800" dirty="0" err="1" smtClean="0"/>
+              <a:t>missing</a:t>
+            </a:r>
+            <a:r>
+              <a:rPr lang="fr-FR" sz="2800" dirty="0" smtClean="0"/>
+              <a:t> profiles (</a:t>
+            </a:r>
+            <a:r>
+              <a:rPr lang="fr-FR" sz="2800" dirty="0" err="1" smtClean="0"/>
+              <a:t>we</a:t>
+            </a:r>
+            <a:r>
+              <a:rPr lang="fr-FR" sz="2800" dirty="0" smtClean="0"/>
+              <a:t> </a:t>
+            </a:r>
+            <a:r>
+              <a:rPr lang="fr-FR" sz="2800" dirty="0" smtClean="0"/>
+              <a:t>do </a:t>
+            </a:r>
+            <a:r>
+              <a:rPr lang="fr-FR" sz="2800" dirty="0" smtClean="0"/>
+              <a:t>not care of </a:t>
+            </a:r>
+            <a:r>
+              <a:rPr lang="fr-FR" sz="2800" dirty="0" err="1" smtClean="0"/>
+              <a:t>missing</a:t>
+            </a:r>
+            <a:r>
+              <a:rPr lang="fr-FR" sz="2800" dirty="0" smtClean="0"/>
+              <a:t> </a:t>
+            </a:r>
+            <a:r>
+              <a:rPr lang="fr-FR" sz="2800" dirty="0" err="1" smtClean="0"/>
               <a:t>Scade</a:t>
             </a:r>
             <a:r>
-              <a:rPr lang="fr-FR" dirty="0" smtClean="0"/>
-              <a:t> profiles for </a:t>
-            </a:r>
-            <a:r>
-              <a:rPr lang="fr-FR" dirty="0" err="1" smtClean="0"/>
+              <a:rPr lang="fr-FR" sz="2800" dirty="0" smtClean="0"/>
+              <a:t> </a:t>
+            </a:r>
+            <a:r>
+              <a:rPr lang="fr-FR" sz="2800" dirty="0" smtClean="0"/>
+              <a:t>profiles for </a:t>
+            </a:r>
+            <a:r>
+              <a:rPr lang="fr-FR" sz="2800" dirty="0" err="1" smtClean="0"/>
               <a:t>now</a:t>
             </a:r>
             <a:r>
-              <a:rPr lang="fr-FR" dirty="0" smtClean="0"/>
+              <a:rPr lang="fr-FR" sz="2800" dirty="0" smtClean="0"/>
               <a:t>)</a:t>
             </a:r>
-            <a:endParaRPr lang="fr-FR" dirty="0"/>
+            <a:endParaRPr lang="fr-FR" sz="2800" dirty="0"/>
           </a:p>
         </p:txBody>
       </p:sp>
@@ -5446,8 +5732,8 @@
         </p:nvGrpSpPr>
         <p:grpSpPr>
           <a:xfrm>
-            <a:off x="1278467" y="1513486"/>
-            <a:ext cx="6510867" cy="5241703"/>
+            <a:off x="2185179" y="2403415"/>
+            <a:ext cx="5319937" cy="4318060"/>
             <a:chOff x="1278467" y="1513486"/>
             <a:chExt cx="6510867" cy="5241703"/>
           </a:xfrm>
@@ -6429,11 +6715,7 @@
             </a:r>
             <a:r>
               <a:rPr lang="fr-FR" dirty="0" smtClean="0"/>
-              <a:t> patches for modification </a:t>
-            </a:r>
-            <a:r>
-              <a:rPr lang="fr-FR" dirty="0" smtClean="0"/>
-              <a:t>of </a:t>
+              <a:t> patches for modification of </a:t>
             </a:r>
             <a:r>
               <a:rPr lang="fr-FR" dirty="0" err="1" smtClean="0"/>
@@ -10689,11 +10971,7 @@
             </a:r>
             <a:r>
               <a:rPr lang="fr-FR" sz="2400" dirty="0" smtClean="0"/>
-              <a:t> </a:t>
-            </a:r>
-            <a:r>
-              <a:rPr lang="fr-FR" sz="2400" dirty="0" smtClean="0"/>
-              <a:t> to </a:t>
+              <a:t>  to </a:t>
             </a:r>
             <a:r>
               <a:rPr lang="fr-FR" sz="2400" dirty="0" err="1" smtClean="0"/>
@@ -10764,11 +11042,7 @@
             </a:r>
             <a:r>
               <a:rPr lang="fr-FR" sz="2400" dirty="0" smtClean="0"/>
-              <a:t> </a:t>
-            </a:r>
-            <a:r>
-              <a:rPr lang="fr-FR" sz="2400" dirty="0" smtClean="0"/>
-              <a:t>configuration: </a:t>
+              <a:t> configuration: </a:t>
             </a:r>
             <a:r>
               <a:rPr lang="fr-FR" sz="2400" dirty="0" err="1" smtClean="0"/>
@@ -10792,11 +11066,7 @@
             </a:r>
             <a:r>
               <a:rPr lang="fr-FR" sz="2400" dirty="0" smtClean="0"/>
-              <a:t> in </a:t>
-            </a:r>
-            <a:r>
-              <a:rPr lang="fr-FR" sz="2400" dirty="0" smtClean="0"/>
-              <a:t>ReqCycle wiki </a:t>
+              <a:t> in ReqCycle wiki </a:t>
             </a:r>
             <a:r>
               <a:rPr lang="fr-FR" sz="2400" dirty="0"/>
@@ -11507,7 +11777,6 @@
               <a:rPr lang="fr-FR" sz="3200" dirty="0"/>
               <a:t> configuration</a:t>
             </a:r>
-            <a:endParaRPr lang="fr-FR" sz="3200" dirty="0"/>
           </a:p>
         </p:txBody>
       </p:sp>

</xml_diff>

<commit_message>
Added check to do on requirement source name
</commit_message>
<xml_diff>
--- a/T7.3/TraceabilityArchitecture/reqCycleUse/ReqCyclePossibleUseForArchitectureVerification-V2.pptx
+++ b/T7.3/TraceabilityArchitecture/reqCycleUse/ReqCyclePossibleUseForArchitectureVerification-V2.pptx
@@ -226,7 +226,7 @@
           <a:p>
             <a:fld id="{A4FCF1EC-1C26-6840-B416-A02DC2D3A261}" type="datetimeFigureOut">
               <a:rPr lang="fr-FR" smtClean="0"/>
-              <a:t>19/11/2015</a:t>
+              <a:t>20/11/2015</a:t>
             </a:fld>
             <a:endParaRPr lang="fr-FR"/>
           </a:p>
@@ -392,7 +392,7 @@
           <a:p>
             <a:fld id="{73363D80-F0F9-C544-A2FA-C621D180FDB5}" type="datetimeFigureOut">
               <a:rPr lang="fr-FR" smtClean="0"/>
-              <a:t>19/11/2015</a:t>
+              <a:t>20/11/2015</a:t>
             </a:fld>
             <a:endParaRPr lang="fr-FR"/>
           </a:p>
@@ -842,7 +842,7 @@
           <a:p>
             <a:fld id="{D053FD6A-4CC7-EF45-AB41-64109787680A}" type="datetime1">
               <a:rPr lang="fr-FR" smtClean="0"/>
-              <a:t>19/11/2015</a:t>
+              <a:t>20/11/2015</a:t>
             </a:fld>
             <a:endParaRPr lang="fr-FR"/>
           </a:p>
@@ -1020,7 +1020,7 @@
           <a:p>
             <a:fld id="{56F1F9C0-95E3-8B44-B7AA-AB861706ABA6}" type="datetime1">
               <a:rPr lang="fr-FR" smtClean="0"/>
-              <a:t>19/11/2015</a:t>
+              <a:t>20/11/2015</a:t>
             </a:fld>
             <a:endParaRPr lang="fr-FR"/>
           </a:p>
@@ -1208,7 +1208,7 @@
           <a:p>
             <a:fld id="{6AF4615C-F89B-1646-BB06-C187E39C5F9F}" type="datetime1">
               <a:rPr lang="fr-FR" smtClean="0"/>
-              <a:t>19/11/2015</a:t>
+              <a:t>20/11/2015</a:t>
             </a:fld>
             <a:endParaRPr lang="fr-FR"/>
           </a:p>
@@ -1386,7 +1386,7 @@
           <a:p>
             <a:fld id="{5FAEC70E-BD7A-C84E-BBB2-A6F04DF88CD6}" type="datetime1">
               <a:rPr lang="fr-FR" smtClean="0"/>
-              <a:t>19/11/2015</a:t>
+              <a:t>20/11/2015</a:t>
             </a:fld>
             <a:endParaRPr lang="fr-FR"/>
           </a:p>
@@ -1640,7 +1640,7 @@
           <a:p>
             <a:fld id="{A3E1B5F2-6384-AA48-811F-3B11712FF934}" type="datetime1">
               <a:rPr lang="fr-FR" smtClean="0"/>
-              <a:t>19/11/2015</a:t>
+              <a:t>20/11/2015</a:t>
             </a:fld>
             <a:endParaRPr lang="fr-FR"/>
           </a:p>
@@ -1936,7 +1936,7 @@
           <a:p>
             <a:fld id="{59A8CFBB-1DE6-C744-89C8-E6D57CED8A10}" type="datetime1">
               <a:rPr lang="fr-FR" smtClean="0"/>
-              <a:t>19/11/2015</a:t>
+              <a:t>20/11/2015</a:t>
             </a:fld>
             <a:endParaRPr lang="fr-FR"/>
           </a:p>
@@ -2366,7 +2366,7 @@
           <a:p>
             <a:fld id="{6C2F8A0C-51C3-D940-BE9D-5C8C507F5EB2}" type="datetime1">
               <a:rPr lang="fr-FR" smtClean="0"/>
-              <a:t>19/11/2015</a:t>
+              <a:t>20/11/2015</a:t>
             </a:fld>
             <a:endParaRPr lang="fr-FR"/>
           </a:p>
@@ -2492,7 +2492,7 @@
           <a:p>
             <a:fld id="{1474B01E-E1D8-2141-854E-B28AEB79A71C}" type="datetime1">
               <a:rPr lang="fr-FR" smtClean="0"/>
-              <a:t>19/11/2015</a:t>
+              <a:t>20/11/2015</a:t>
             </a:fld>
             <a:endParaRPr lang="fr-FR"/>
           </a:p>
@@ -2595,7 +2595,7 @@
           <a:p>
             <a:fld id="{1411AB96-EE40-AE4D-B803-8090FB775C59}" type="datetime1">
               <a:rPr lang="fr-FR" smtClean="0"/>
-              <a:t>19/11/2015</a:t>
+              <a:t>20/11/2015</a:t>
             </a:fld>
             <a:endParaRPr lang="fr-FR"/>
           </a:p>
@@ -2880,7 +2880,7 @@
           <a:p>
             <a:fld id="{4902E5C2-4F2E-7947-B55D-E6E7CCB6601A}" type="datetime1">
               <a:rPr lang="fr-FR" smtClean="0"/>
-              <a:t>19/11/2015</a:t>
+              <a:t>20/11/2015</a:t>
             </a:fld>
             <a:endParaRPr lang="fr-FR"/>
           </a:p>
@@ -3141,7 +3141,7 @@
           <a:p>
             <a:fld id="{5FBDED86-FF26-7149-A82E-CD9466969CB8}" type="datetime1">
               <a:rPr lang="fr-FR" smtClean="0"/>
-              <a:t>19/11/2015</a:t>
+              <a:t>20/11/2015</a:t>
             </a:fld>
             <a:endParaRPr lang="fr-FR"/>
           </a:p>
@@ -3362,7 +3362,7 @@
           <a:p>
             <a:fld id="{20A70C30-3957-4E40-889C-49A1A0F3A6D0}" type="datetime1">
               <a:rPr lang="fr-FR" smtClean="0"/>
-              <a:t>19/11/2015</a:t>
+              <a:t>20/11/2015</a:t>
             </a:fld>
             <a:endParaRPr lang="fr-FR"/>
           </a:p>
@@ -3789,11 +3789,15 @@
           <a:p>
             <a:r>
               <a:rPr lang="fr-FR" dirty="0" smtClean="0"/>
-              <a:t>V1.1 </a:t>
-            </a:r>
-            <a:r>
-              <a:rPr lang="fr-FR" smtClean="0"/>
-              <a:t>– 19th </a:t>
+              <a:t>V1.2 </a:t>
+            </a:r>
+            <a:r>
+              <a:rPr lang="fr-FR" smtClean="0"/>
+              <a:t>– </a:t>
+            </a:r>
+            <a:r>
+              <a:rPr lang="fr-FR" smtClean="0"/>
+              <a:t>21st </a:t>
             </a:r>
             <a:r>
               <a:rPr lang="fr-FR" dirty="0" smtClean="0"/>
@@ -3833,7 +3837,7 @@
           <a:p>
             <a:fld id="{931BA0ED-3995-4747-8D64-4EFA267CD4C2}" type="datetime1">
               <a:rPr lang="fr-FR" smtClean="0"/>
-              <a:t>19/11/2015</a:t>
+              <a:t>20/11/2015</a:t>
             </a:fld>
             <a:endParaRPr lang="fr-FR"/>
           </a:p>
@@ -4037,7 +4041,7 @@
           <a:p>
             <a:fld id="{D053FD6A-4CC7-EF45-AB41-64109787680A}" type="datetime1">
               <a:rPr lang="fr-FR" smtClean="0"/>
-              <a:t>19/11/2015</a:t>
+              <a:t>20/11/2015</a:t>
             </a:fld>
             <a:endParaRPr lang="fr-FR"/>
           </a:p>
@@ -4200,11 +4204,7 @@
             </a:r>
             <a:r>
               <a:rPr lang="fr-FR" sz="2800" dirty="0" smtClean="0"/>
-              <a:t>pen </a:t>
-            </a:r>
-            <a:r>
-              <a:rPr lang="fr-FR" sz="2800" dirty="0" smtClean="0"/>
-              <a:t>ReqCycle </a:t>
+              <a:t>pen ReqCycle </a:t>
             </a:r>
             <a:r>
               <a:rPr lang="fr-FR" sz="2800" dirty="0"/>
@@ -4231,11 +4231,7 @@
             </a:r>
             <a:r>
               <a:rPr lang="fr-FR" sz="2800" dirty="0" smtClean="0"/>
-              <a:t>Reference </a:t>
-            </a:r>
-            <a:r>
-              <a:rPr lang="fr-FR" sz="2800" dirty="0" smtClean="0"/>
-              <a:t>requirements</a:t>
+              <a:t>Reference requirements</a:t>
             </a:r>
             <a:r>
               <a:rPr lang="fr-FR" sz="2800" dirty="0"/>
@@ -4382,7 +4378,7 @@
           <a:p>
             <a:fld id="{5FAEC70E-BD7A-C84E-BBB2-A6F04DF88CD6}" type="datetime1">
               <a:rPr lang="fr-FR" smtClean="0"/>
-              <a:t>19/11/2015</a:t>
+              <a:t>20/11/2015</a:t>
             </a:fld>
             <a:endParaRPr lang="fr-FR"/>
           </a:p>
@@ -4537,15 +4533,26 @@
             </a:r>
             <a:r>
               <a:rPr lang="fr-FR" sz="2400" dirty="0" smtClean="0"/>
-              <a:t> tutorial (</a:t>
+              <a:t> </a:t>
+            </a:r>
+            <a:r>
+              <a:rPr lang="fr-FR" sz="2400" dirty="0" smtClean="0"/>
+              <a:t>tutorial</a:t>
+            </a:r>
+            <a:br>
+              <a:rPr lang="fr-FR" sz="2400" dirty="0" smtClean="0"/>
+            </a:br>
+            <a:r>
+              <a:rPr lang="fr-FR" sz="2400" dirty="0" smtClean="0"/>
+              <a:t> (</a:t>
             </a:r>
             <a:r>
               <a:rPr lang="fr-FR" sz="2400" dirty="0" err="1" smtClean="0"/>
-              <a:t>see</a:t>
+              <a:t>below</a:t>
             </a:r>
             <a:r>
               <a:rPr lang="fr-FR" sz="2400" dirty="0" smtClean="0"/>
-              <a:t> </a:t>
+              <a:t> and </a:t>
             </a:r>
             <a:r>
               <a:rPr lang="fr-FR" sz="2400" dirty="0" err="1" smtClean="0"/>
@@ -4690,7 +4697,7 @@
         </p:blipFill>
         <p:spPr>
           <a:xfrm>
-            <a:off x="4661690" y="2780559"/>
+            <a:off x="4661690" y="2391534"/>
             <a:ext cx="4160463" cy="2607317"/>
           </a:xfrm>
           <a:prstGeom prst="rect">
@@ -4720,7 +4727,7 @@
           <a:p>
             <a:fld id="{76309974-C4F7-D647-978F-7550742E7D78}" type="datetime1">
               <a:rPr lang="fr-FR" smtClean="0"/>
-              <a:t>19/11/2015</a:t>
+              <a:t>21/11/2015</a:t>
             </a:fld>
             <a:endParaRPr lang="fr-FR"/>
           </a:p>
@@ -4746,6 +4753,148 @@
               <a:t>12</a:t>
             </a:fld>
             <a:endParaRPr lang="fr-FR"/>
+          </a:p>
+        </p:txBody>
+      </p:sp>
+      <p:sp>
+        <p:nvSpPr>
+          <p:cNvPr id="10" name="Rectangle à coins arrondis 9"/>
+          <p:cNvSpPr/>
+          <p:nvPr/>
+        </p:nvSpPr>
+        <p:spPr>
+          <a:xfrm>
+            <a:off x="1402393" y="5433644"/>
+            <a:ext cx="737023" cy="211667"/>
+          </a:xfrm>
+          <a:prstGeom prst="roundRect">
+            <a:avLst/>
+          </a:prstGeom>
+          <a:noFill/>
+          <a:ln>
+            <a:solidFill>
+              <a:srgbClr val="0000FF"/>
+            </a:solidFill>
+          </a:ln>
+        </p:spPr>
+        <p:style>
+          <a:lnRef idx="1">
+            <a:schemeClr val="accent1"/>
+          </a:lnRef>
+          <a:fillRef idx="3">
+            <a:schemeClr val="accent1"/>
+          </a:fillRef>
+          <a:effectRef idx="2">
+            <a:schemeClr val="accent1"/>
+          </a:effectRef>
+          <a:fontRef idx="minor">
+            <a:schemeClr val="lt1"/>
+          </a:fontRef>
+        </p:style>
+        <p:txBody>
+          <a:bodyPr rtlCol="0" anchor="ctr"/>
+          <a:lstStyle/>
+          <a:p>
+            <a:pPr algn="ctr"/>
+            <a:endParaRPr lang="fr-FR"/>
+          </a:p>
+        </p:txBody>
+      </p:sp>
+      <p:sp>
+        <p:nvSpPr>
+          <p:cNvPr id="4" name="ZoneTexte 3"/>
+          <p:cNvSpPr txBox="1"/>
+          <p:nvPr/>
+        </p:nvSpPr>
+        <p:spPr>
+          <a:xfrm>
+            <a:off x="2391111" y="5322145"/>
+            <a:ext cx="4747902" cy="646331"/>
+          </a:xfrm>
+          <a:prstGeom prst="rect">
+            <a:avLst/>
+          </a:prstGeom>
+          <a:noFill/>
+        </p:spPr>
+        <p:txBody>
+          <a:bodyPr wrap="square" rtlCol="0">
+            <a:spAutoFit/>
+          </a:bodyPr>
+          <a:lstStyle/>
+          <a:p>
+            <a:r>
+              <a:rPr lang="fr-FR" dirty="0" err="1" smtClean="0"/>
+              <a:t>Avoid</a:t>
+            </a:r>
+            <a:r>
+              <a:rPr lang="fr-FR" dirty="0" smtClean="0"/>
+              <a:t> </a:t>
+            </a:r>
+            <a:r>
+              <a:rPr lang="fr-FR" dirty="0" err="1" smtClean="0"/>
+              <a:t>special</a:t>
+            </a:r>
+            <a:r>
+              <a:rPr lang="fr-FR" dirty="0" smtClean="0"/>
+              <a:t> </a:t>
+            </a:r>
+            <a:r>
+              <a:rPr lang="fr-FR" dirty="0" err="1" smtClean="0"/>
+              <a:t>characters</a:t>
+            </a:r>
+            <a:r>
+              <a:rPr lang="fr-FR" dirty="0" smtClean="0"/>
+              <a:t> in </a:t>
+            </a:r>
+            <a:r>
+              <a:rPr lang="fr-FR" dirty="0" err="1" smtClean="0"/>
+              <a:t>name</a:t>
+            </a:r>
+            <a:r>
+              <a:rPr lang="fr-FR" dirty="0" smtClean="0"/>
+              <a:t>: « - » </a:t>
+            </a:r>
+            <a:r>
+              <a:rPr lang="fr-FR" dirty="0" err="1" smtClean="0"/>
+              <a:t>is</a:t>
+            </a:r>
+            <a:r>
+              <a:rPr lang="fr-FR" dirty="0" smtClean="0"/>
+              <a:t> OK but </a:t>
+            </a:r>
+            <a:r>
+              <a:rPr lang="fr-FR" dirty="0" err="1" smtClean="0"/>
+              <a:t>other</a:t>
+            </a:r>
+            <a:r>
+              <a:rPr lang="fr-FR" dirty="0"/>
+              <a:t> </a:t>
+            </a:r>
+            <a:r>
+              <a:rPr lang="fr-FR" dirty="0" err="1" smtClean="0"/>
+              <a:t>ones</a:t>
+            </a:r>
+            <a:r>
+              <a:rPr lang="fr-FR" dirty="0" smtClean="0"/>
+              <a:t> </a:t>
+            </a:r>
+            <a:r>
+              <a:rPr lang="fr-FR" dirty="0" err="1" smtClean="0"/>
+              <a:t>might</a:t>
+            </a:r>
+            <a:r>
+              <a:rPr lang="fr-FR" dirty="0" smtClean="0"/>
+              <a:t> </a:t>
+            </a:r>
+            <a:r>
+              <a:rPr lang="fr-FR" dirty="0" err="1" smtClean="0"/>
+              <a:t>raise</a:t>
+            </a:r>
+            <a:r>
+              <a:rPr lang="fr-FR" dirty="0" smtClean="0"/>
+              <a:t> bugs</a:t>
+            </a:r>
+            <a:endParaRPr lang="fr-FR" dirty="0"/>
           </a:p>
         </p:txBody>
       </p:sp>
@@ -4921,7 +5070,7 @@
           <a:p>
             <a:fld id="{FB294DE3-1705-BA49-A562-2B3F63994DF3}" type="datetime1">
               <a:rPr lang="fr-FR" smtClean="0"/>
-              <a:t>19/11/2015</a:t>
+              <a:t>20/11/2015</a:t>
             </a:fld>
             <a:endParaRPr lang="fr-FR"/>
           </a:p>
@@ -5247,7 +5396,7 @@
           <a:p>
             <a:fld id="{9062B7D9-CB0B-694E-9EB8-45448D0D1A76}" type="datetime1">
               <a:rPr lang="fr-FR" smtClean="0"/>
-              <a:t>19/11/2015</a:t>
+              <a:t>20/11/2015</a:t>
             </a:fld>
             <a:endParaRPr lang="fr-FR"/>
           </a:p>
@@ -5480,7 +5629,7 @@
           <a:p>
             <a:fld id="{65349B9E-AE93-4C4B-9FC6-B0A2130D3DBD}" type="datetime1">
               <a:rPr lang="fr-FR" smtClean="0"/>
-              <a:t>19/11/2015</a:t>
+              <a:t>20/11/2015</a:t>
             </a:fld>
             <a:endParaRPr lang="fr-FR"/>
           </a:p>
@@ -5574,11 +5723,7 @@
             </a:r>
             <a:r>
               <a:rPr lang="fr-FR" sz="2800" dirty="0" smtClean="0"/>
-              <a:t> ETCS papyrus SysML model </a:t>
-            </a:r>
-            <a:r>
-              <a:rPr lang="fr-FR" sz="2800" dirty="0" smtClean="0"/>
-              <a:t>(in </a:t>
+              <a:t> ETCS papyrus SysML model (in </a:t>
             </a:r>
             <a:r>
               <a:rPr lang="fr-FR" sz="2800" dirty="0" err="1" smtClean="0"/>
@@ -5682,15 +5827,7 @@
             </a:r>
             <a:r>
               <a:rPr lang="fr-FR" sz="2800" dirty="0" smtClean="0"/>
-              <a:t> </a:t>
-            </a:r>
-            <a:r>
-              <a:rPr lang="fr-FR" sz="2800" dirty="0" smtClean="0"/>
-              <a:t>do </a:t>
-            </a:r>
-            <a:r>
-              <a:rPr lang="fr-FR" sz="2800" dirty="0" smtClean="0"/>
-              <a:t>not care of </a:t>
+              <a:t> do not care of </a:t>
             </a:r>
             <a:r>
               <a:rPr lang="fr-FR" sz="2800" dirty="0" err="1" smtClean="0"/>
@@ -5706,11 +5843,7 @@
             </a:r>
             <a:r>
               <a:rPr lang="fr-FR" sz="2800" dirty="0" smtClean="0"/>
-              <a:t> </a:t>
-            </a:r>
-            <a:r>
-              <a:rPr lang="fr-FR" sz="2800" dirty="0" smtClean="0"/>
-              <a:t>profiles for </a:t>
+              <a:t> profiles for </a:t>
             </a:r>
             <a:r>
               <a:rPr lang="fr-FR" sz="2800" dirty="0" err="1" smtClean="0"/>
@@ -5824,7 +5957,7 @@
           <a:p>
             <a:fld id="{74044B81-14A6-974C-9A01-535A71D5DC6E}" type="datetime1">
               <a:rPr lang="fr-FR" smtClean="0"/>
-              <a:t>19/11/2015</a:t>
+              <a:t>20/11/2015</a:t>
             </a:fld>
             <a:endParaRPr lang="fr-FR"/>
           </a:p>
@@ -5985,7 +6118,7 @@
           <a:p>
             <a:fld id="{6E617818-BD15-6440-88BB-1A212B67A353}" type="datetime1">
               <a:rPr lang="fr-FR" smtClean="0"/>
-              <a:t>19/11/2015</a:t>
+              <a:t>20/11/2015</a:t>
             </a:fld>
             <a:endParaRPr lang="fr-FR"/>
           </a:p>
@@ -6185,7 +6318,7 @@
           <a:p>
             <a:fld id="{C8B1640C-39B1-1D44-972E-3A68EE7DDC87}" type="datetime1">
               <a:rPr lang="fr-FR" smtClean="0"/>
-              <a:t>19/11/2015</a:t>
+              <a:t>20/11/2015</a:t>
             </a:fld>
             <a:endParaRPr lang="fr-FR"/>
           </a:p>
@@ -6592,7 +6725,7 @@
           <a:p>
             <a:fld id="{B8393D6F-7F96-7F48-AADB-ADA6C3046919}" type="datetime1">
               <a:rPr lang="fr-FR" smtClean="0"/>
-              <a:t>19/11/2015</a:t>
+              <a:t>20/11/2015</a:t>
             </a:fld>
             <a:endParaRPr lang="fr-FR"/>
           </a:p>
@@ -6715,16 +6848,13 @@
             </a:r>
             <a:r>
               <a:rPr lang="fr-FR" dirty="0" smtClean="0"/>
-              <a:t> patches for modification of </a:t>
-            </a:r>
-            <a:r>
-              <a:rPr lang="fr-FR" dirty="0" err="1" smtClean="0"/>
-              <a:t>attribute</a:t>
-            </a:r>
-            <a:r>
-              <a:rPr lang="fr-FR" dirty="0" smtClean="0"/>
-              <a:t> values and csv export</a:t>
-            </a:r>
+              <a:t> patches for </a:t>
+            </a:r>
+            <a:r>
+              <a:rPr lang="fr-FR" dirty="0" smtClean="0"/>
+              <a:t>bugs 625, 626, 627 and 642</a:t>
+            </a:r>
+            <a:endParaRPr lang="fr-FR" dirty="0" smtClean="0"/>
           </a:p>
           <a:p>
             <a:pPr marL="514350" indent="-514350">
@@ -6754,12 +6884,8 @@
               <a:t> </a:t>
             </a:r>
             <a:r>
-              <a:rPr lang="fr-FR" dirty="0" err="1" smtClean="0"/>
-              <a:t>abd</a:t>
-            </a:r>
-            <a:r>
-              <a:rPr lang="fr-FR" dirty="0" smtClean="0"/>
-              <a:t> </a:t>
+              <a:rPr lang="fr-FR" dirty="0" smtClean="0"/>
+              <a:t>and </a:t>
             </a:r>
             <a:r>
               <a:rPr lang="fr-FR" dirty="0" err="1" smtClean="0"/>
@@ -6836,7 +6962,7 @@
           <a:p>
             <a:fld id="{5FAEC70E-BD7A-C84E-BBB2-A6F04DF88CD6}" type="datetime1">
               <a:rPr lang="fr-FR" smtClean="0"/>
-              <a:t>19/11/2015</a:t>
+              <a:t>20/11/2015</a:t>
             </a:fld>
             <a:endParaRPr lang="fr-FR"/>
           </a:p>
@@ -7094,7 +7220,7 @@
           <a:p>
             <a:fld id="{A983BED7-3CE8-5445-9F10-880FE77D0A8A}" type="datetime1">
               <a:rPr lang="fr-FR" smtClean="0"/>
-              <a:t>19/11/2015</a:t>
+              <a:t>20/11/2015</a:t>
             </a:fld>
             <a:endParaRPr lang="fr-FR"/>
           </a:p>
@@ -7394,7 +7520,7 @@
           <a:p>
             <a:fld id="{5FAEC70E-BD7A-C84E-BBB2-A6F04DF88CD6}" type="datetime1">
               <a:rPr lang="fr-FR" smtClean="0"/>
-              <a:t>19/11/2015</a:t>
+              <a:t>20/11/2015</a:t>
             </a:fld>
             <a:endParaRPr lang="fr-FR"/>
           </a:p>
@@ -7659,7 +7785,7 @@
           <a:p>
             <a:fld id="{062BC1FB-D1C0-D747-8D2F-B5DDBADEE4B9}" type="datetime1">
               <a:rPr lang="fr-FR" smtClean="0"/>
-              <a:t>19/11/2015</a:t>
+              <a:t>20/11/2015</a:t>
             </a:fld>
             <a:endParaRPr lang="fr-FR"/>
           </a:p>
@@ -7958,7 +8084,7 @@
           <a:p>
             <a:fld id="{26F1154D-8A10-254C-A651-5AB85C1F60B8}" type="datetime1">
               <a:rPr lang="fr-FR" smtClean="0"/>
-              <a:t>19/11/2015</a:t>
+              <a:t>20/11/2015</a:t>
             </a:fld>
             <a:endParaRPr lang="fr-FR"/>
           </a:p>
@@ -8227,7 +8353,7 @@
           <a:p>
             <a:fld id="{B12139B0-5524-B944-8CED-1C9CACAE70ED}" type="datetime1">
               <a:rPr lang="fr-FR" smtClean="0"/>
-              <a:t>19/11/2015</a:t>
+              <a:t>20/11/2015</a:t>
             </a:fld>
             <a:endParaRPr lang="fr-FR" dirty="0"/>
           </a:p>
@@ -8411,7 +8537,7 @@
           <a:p>
             <a:fld id="{D053FD6A-4CC7-EF45-AB41-64109787680A}" type="datetime1">
               <a:rPr lang="fr-FR" smtClean="0"/>
-              <a:t>19/11/2015</a:t>
+              <a:t>20/11/2015</a:t>
             </a:fld>
             <a:endParaRPr lang="fr-FR"/>
           </a:p>
@@ -8846,7 +8972,7 @@
           <a:p>
             <a:fld id="{5FAEC70E-BD7A-C84E-BBB2-A6F04DF88CD6}" type="datetime1">
               <a:rPr lang="fr-FR" smtClean="0"/>
-              <a:t>19/11/2015</a:t>
+              <a:t>20/11/2015</a:t>
             </a:fld>
             <a:endParaRPr lang="fr-FR"/>
           </a:p>
@@ -8979,7 +9105,7 @@
           <a:p>
             <a:fld id="{D053FD6A-4CC7-EF45-AB41-64109787680A}" type="datetime1">
               <a:rPr lang="fr-FR" smtClean="0"/>
-              <a:t>19/11/2015</a:t>
+              <a:t>20/11/2015</a:t>
             </a:fld>
             <a:endParaRPr lang="fr-FR"/>
           </a:p>
@@ -9343,7 +9469,7 @@
           <a:p>
             <a:fld id="{5FAEC70E-BD7A-C84E-BBB2-A6F04DF88CD6}" type="datetime1">
               <a:rPr lang="fr-FR" smtClean="0"/>
-              <a:t>19/11/2015</a:t>
+              <a:t>20/11/2015</a:t>
             </a:fld>
             <a:endParaRPr lang="fr-FR"/>
           </a:p>
@@ -9472,7 +9598,7 @@
           <a:p>
             <a:fld id="{D053FD6A-4CC7-EF45-AB41-64109787680A}" type="datetime1">
               <a:rPr lang="fr-FR" smtClean="0"/>
-              <a:t>19/11/2015</a:t>
+              <a:t>20/11/2015</a:t>
             </a:fld>
             <a:endParaRPr lang="fr-FR"/>
           </a:p>
@@ -9590,7 +9716,7 @@
           <a:p>
             <a:fld id="{D053FD6A-4CC7-EF45-AB41-64109787680A}" type="datetime1">
               <a:rPr lang="fr-FR" smtClean="0"/>
-              <a:t>19/11/2015</a:t>
+              <a:t>20/11/2015</a:t>
             </a:fld>
             <a:endParaRPr lang="fr-FR"/>
           </a:p>
@@ -9728,7 +9854,7 @@
           <a:p>
             <a:fld id="{D053FD6A-4CC7-EF45-AB41-64109787680A}" type="datetime1">
               <a:rPr lang="fr-FR" smtClean="0"/>
-              <a:t>19/11/2015</a:t>
+              <a:t>20/11/2015</a:t>
             </a:fld>
             <a:endParaRPr lang="fr-FR"/>
           </a:p>
@@ -9975,7 +10101,7 @@
           <a:p>
             <a:fld id="{5FAEC70E-BD7A-C84E-BBB2-A6F04DF88CD6}" type="datetime1">
               <a:rPr lang="fr-FR" smtClean="0"/>
-              <a:t>19/11/2015</a:t>
+              <a:t>20/11/2015</a:t>
             </a:fld>
             <a:endParaRPr lang="fr-FR"/>
           </a:p>
@@ -10100,7 +10226,7 @@
           <a:p>
             <a:fld id="{5FAEC70E-BD7A-C84E-BBB2-A6F04DF88CD6}" type="datetime1">
               <a:rPr lang="fr-FR" smtClean="0"/>
-              <a:t>19/11/2015</a:t>
+              <a:t>20/11/2015</a:t>
             </a:fld>
             <a:endParaRPr lang="fr-FR"/>
           </a:p>
@@ -10565,7 +10691,7 @@
           <a:p>
             <a:fld id="{5FAEC70E-BD7A-C84E-BBB2-A6F04DF88CD6}" type="datetime1">
               <a:rPr lang="fr-FR" smtClean="0"/>
-              <a:t>19/11/2015</a:t>
+              <a:t>20/11/2015</a:t>
             </a:fld>
             <a:endParaRPr lang="fr-FR"/>
           </a:p>
@@ -10691,7 +10817,7 @@
           <a:p>
             <a:fld id="{D053FD6A-4CC7-EF45-AB41-64109787680A}" type="datetime1">
               <a:rPr lang="fr-FR" smtClean="0"/>
-              <a:t>19/11/2015</a:t>
+              <a:t>20/11/2015</a:t>
             </a:fld>
             <a:endParaRPr lang="fr-FR"/>
           </a:p>
@@ -11135,7 +11261,7 @@
           <a:p>
             <a:fld id="{5FAEC70E-BD7A-C84E-BBB2-A6F04DF88CD6}" type="datetime1">
               <a:rPr lang="fr-FR" smtClean="0"/>
-              <a:t>19/11/2015</a:t>
+              <a:t>20/11/2015</a:t>
             </a:fld>
             <a:endParaRPr lang="fr-FR"/>
           </a:p>
@@ -11319,7 +11445,7 @@
           <a:p>
             <a:fld id="{5FAEC70E-BD7A-C84E-BBB2-A6F04DF88CD6}" type="datetime1">
               <a:rPr lang="fr-FR" smtClean="0"/>
-              <a:t>19/11/2015</a:t>
+              <a:t>20/11/2015</a:t>
             </a:fld>
             <a:endParaRPr lang="fr-FR"/>
           </a:p>
@@ -11515,7 +11641,7 @@
           <a:p>
             <a:fld id="{F4335CCC-D631-7E4D-A7CC-111A809CA31E}" type="datetime1">
               <a:rPr lang="fr-FR" smtClean="0"/>
-              <a:t>19/11/2015</a:t>
+              <a:t>20/11/2015</a:t>
             </a:fld>
             <a:endParaRPr lang="fr-FR"/>
           </a:p>
@@ -11821,7 +11947,7 @@
           <a:p>
             <a:fld id="{4FDD3FE7-4BE0-AC4F-9F41-B03702F84959}" type="datetime1">
               <a:rPr lang="fr-FR" smtClean="0"/>
-              <a:t>19/11/2015</a:t>
+              <a:t>20/11/2015</a:t>
             </a:fld>
             <a:endParaRPr lang="fr-FR"/>
           </a:p>

</xml_diff>

<commit_message>
Added tip for traceability table - refresh button
</commit_message>
<xml_diff>
--- a/T7.3/TraceabilityArchitecture/reqCycleUse/ReqCyclePossibleUseForArchitectureVerification-V2.pptx
+++ b/T7.3/TraceabilityArchitecture/reqCycleUse/ReqCyclePossibleUseForArchitectureVerification-V2.pptx
@@ -226,7 +226,7 @@
           <a:p>
             <a:fld id="{A4FCF1EC-1C26-6840-B416-A02DC2D3A261}" type="datetimeFigureOut">
               <a:rPr lang="fr-FR" smtClean="0"/>
-              <a:t>20/11/2015</a:t>
+              <a:t>21/11/2015</a:t>
             </a:fld>
             <a:endParaRPr lang="fr-FR"/>
           </a:p>
@@ -392,7 +392,7 @@
           <a:p>
             <a:fld id="{73363D80-F0F9-C544-A2FA-C621D180FDB5}" type="datetimeFigureOut">
               <a:rPr lang="fr-FR" smtClean="0"/>
-              <a:t>20/11/2015</a:t>
+              <a:t>21/11/2015</a:t>
             </a:fld>
             <a:endParaRPr lang="fr-FR"/>
           </a:p>
@@ -842,7 +842,7 @@
           <a:p>
             <a:fld id="{D053FD6A-4CC7-EF45-AB41-64109787680A}" type="datetime1">
               <a:rPr lang="fr-FR" smtClean="0"/>
-              <a:t>20/11/2015</a:t>
+              <a:t>21/11/2015</a:t>
             </a:fld>
             <a:endParaRPr lang="fr-FR"/>
           </a:p>
@@ -1020,7 +1020,7 @@
           <a:p>
             <a:fld id="{56F1F9C0-95E3-8B44-B7AA-AB861706ABA6}" type="datetime1">
               <a:rPr lang="fr-FR" smtClean="0"/>
-              <a:t>20/11/2015</a:t>
+              <a:t>21/11/2015</a:t>
             </a:fld>
             <a:endParaRPr lang="fr-FR"/>
           </a:p>
@@ -1208,7 +1208,7 @@
           <a:p>
             <a:fld id="{6AF4615C-F89B-1646-BB06-C187E39C5F9F}" type="datetime1">
               <a:rPr lang="fr-FR" smtClean="0"/>
-              <a:t>20/11/2015</a:t>
+              <a:t>21/11/2015</a:t>
             </a:fld>
             <a:endParaRPr lang="fr-FR"/>
           </a:p>
@@ -1386,7 +1386,7 @@
           <a:p>
             <a:fld id="{5FAEC70E-BD7A-C84E-BBB2-A6F04DF88CD6}" type="datetime1">
               <a:rPr lang="fr-FR" smtClean="0"/>
-              <a:t>20/11/2015</a:t>
+              <a:t>21/11/2015</a:t>
             </a:fld>
             <a:endParaRPr lang="fr-FR"/>
           </a:p>
@@ -1640,7 +1640,7 @@
           <a:p>
             <a:fld id="{A3E1B5F2-6384-AA48-811F-3B11712FF934}" type="datetime1">
               <a:rPr lang="fr-FR" smtClean="0"/>
-              <a:t>20/11/2015</a:t>
+              <a:t>21/11/2015</a:t>
             </a:fld>
             <a:endParaRPr lang="fr-FR"/>
           </a:p>
@@ -1936,7 +1936,7 @@
           <a:p>
             <a:fld id="{59A8CFBB-1DE6-C744-89C8-E6D57CED8A10}" type="datetime1">
               <a:rPr lang="fr-FR" smtClean="0"/>
-              <a:t>20/11/2015</a:t>
+              <a:t>21/11/2015</a:t>
             </a:fld>
             <a:endParaRPr lang="fr-FR"/>
           </a:p>
@@ -2366,7 +2366,7 @@
           <a:p>
             <a:fld id="{6C2F8A0C-51C3-D940-BE9D-5C8C507F5EB2}" type="datetime1">
               <a:rPr lang="fr-FR" smtClean="0"/>
-              <a:t>20/11/2015</a:t>
+              <a:t>21/11/2015</a:t>
             </a:fld>
             <a:endParaRPr lang="fr-FR"/>
           </a:p>
@@ -2492,7 +2492,7 @@
           <a:p>
             <a:fld id="{1474B01E-E1D8-2141-854E-B28AEB79A71C}" type="datetime1">
               <a:rPr lang="fr-FR" smtClean="0"/>
-              <a:t>20/11/2015</a:t>
+              <a:t>21/11/2015</a:t>
             </a:fld>
             <a:endParaRPr lang="fr-FR"/>
           </a:p>
@@ -2595,7 +2595,7 @@
           <a:p>
             <a:fld id="{1411AB96-EE40-AE4D-B803-8090FB775C59}" type="datetime1">
               <a:rPr lang="fr-FR" smtClean="0"/>
-              <a:t>20/11/2015</a:t>
+              <a:t>21/11/2015</a:t>
             </a:fld>
             <a:endParaRPr lang="fr-FR"/>
           </a:p>
@@ -2880,7 +2880,7 @@
           <a:p>
             <a:fld id="{4902E5C2-4F2E-7947-B55D-E6E7CCB6601A}" type="datetime1">
               <a:rPr lang="fr-FR" smtClean="0"/>
-              <a:t>20/11/2015</a:t>
+              <a:t>21/11/2015</a:t>
             </a:fld>
             <a:endParaRPr lang="fr-FR"/>
           </a:p>
@@ -3141,7 +3141,7 @@
           <a:p>
             <a:fld id="{5FBDED86-FF26-7149-A82E-CD9466969CB8}" type="datetime1">
               <a:rPr lang="fr-FR" smtClean="0"/>
-              <a:t>20/11/2015</a:t>
+              <a:t>21/11/2015</a:t>
             </a:fld>
             <a:endParaRPr lang="fr-FR"/>
           </a:p>
@@ -3362,7 +3362,7 @@
           <a:p>
             <a:fld id="{20A70C30-3957-4E40-889C-49A1A0F3A6D0}" type="datetime1">
               <a:rPr lang="fr-FR" smtClean="0"/>
-              <a:t>20/11/2015</a:t>
+              <a:t>21/11/2015</a:t>
             </a:fld>
             <a:endParaRPr lang="fr-FR"/>
           </a:p>
@@ -3793,11 +3793,7 @@
             </a:r>
             <a:r>
               <a:rPr lang="fr-FR" smtClean="0"/>
-              <a:t>– </a:t>
-            </a:r>
-            <a:r>
-              <a:rPr lang="fr-FR" smtClean="0"/>
-              <a:t>21st </a:t>
+              <a:t>– 21st </a:t>
             </a:r>
             <a:r>
               <a:rPr lang="fr-FR" dirty="0" smtClean="0"/>
@@ -3837,7 +3833,7 @@
           <a:p>
             <a:fld id="{931BA0ED-3995-4747-8D64-4EFA267CD4C2}" type="datetime1">
               <a:rPr lang="fr-FR" smtClean="0"/>
-              <a:t>20/11/2015</a:t>
+              <a:t>21/11/2015</a:t>
             </a:fld>
             <a:endParaRPr lang="fr-FR"/>
           </a:p>
@@ -4041,7 +4037,7 @@
           <a:p>
             <a:fld id="{D053FD6A-4CC7-EF45-AB41-64109787680A}" type="datetime1">
               <a:rPr lang="fr-FR" smtClean="0"/>
-              <a:t>20/11/2015</a:t>
+              <a:t>21/11/2015</a:t>
             </a:fld>
             <a:endParaRPr lang="fr-FR"/>
           </a:p>
@@ -4378,7 +4374,7 @@
           <a:p>
             <a:fld id="{5FAEC70E-BD7A-C84E-BBB2-A6F04DF88CD6}" type="datetime1">
               <a:rPr lang="fr-FR" smtClean="0"/>
-              <a:t>20/11/2015</a:t>
+              <a:t>21/11/2015</a:t>
             </a:fld>
             <a:endParaRPr lang="fr-FR"/>
           </a:p>
@@ -4533,11 +4529,7 @@
             </a:r>
             <a:r>
               <a:rPr lang="fr-FR" sz="2400" dirty="0" smtClean="0"/>
-              <a:t> </a:t>
-            </a:r>
-            <a:r>
-              <a:rPr lang="fr-FR" sz="2400" dirty="0" smtClean="0"/>
-              <a:t>tutorial</a:t>
+              <a:t> tutorial</a:t>
             </a:r>
             <a:br>
               <a:rPr lang="fr-FR" sz="2400" dirty="0" smtClean="0"/>
@@ -5070,7 +5062,7 @@
           <a:p>
             <a:fld id="{FB294DE3-1705-BA49-A562-2B3F63994DF3}" type="datetime1">
               <a:rPr lang="fr-FR" smtClean="0"/>
-              <a:t>20/11/2015</a:t>
+              <a:t>21/11/2015</a:t>
             </a:fld>
             <a:endParaRPr lang="fr-FR"/>
           </a:p>
@@ -5396,7 +5388,7 @@
           <a:p>
             <a:fld id="{9062B7D9-CB0B-694E-9EB8-45448D0D1A76}" type="datetime1">
               <a:rPr lang="fr-FR" smtClean="0"/>
-              <a:t>20/11/2015</a:t>
+              <a:t>21/11/2015</a:t>
             </a:fld>
             <a:endParaRPr lang="fr-FR"/>
           </a:p>
@@ -5629,7 +5621,7 @@
           <a:p>
             <a:fld id="{65349B9E-AE93-4C4B-9FC6-B0A2130D3DBD}" type="datetime1">
               <a:rPr lang="fr-FR" smtClean="0"/>
-              <a:t>20/11/2015</a:t>
+              <a:t>21/11/2015</a:t>
             </a:fld>
             <a:endParaRPr lang="fr-FR"/>
           </a:p>
@@ -5957,7 +5949,7 @@
           <a:p>
             <a:fld id="{74044B81-14A6-974C-9A01-535A71D5DC6E}" type="datetime1">
               <a:rPr lang="fr-FR" smtClean="0"/>
-              <a:t>20/11/2015</a:t>
+              <a:t>21/11/2015</a:t>
             </a:fld>
             <a:endParaRPr lang="fr-FR"/>
           </a:p>
@@ -6118,7 +6110,7 @@
           <a:p>
             <a:fld id="{6E617818-BD15-6440-88BB-1A212B67A353}" type="datetime1">
               <a:rPr lang="fr-FR" smtClean="0"/>
-              <a:t>20/11/2015</a:t>
+              <a:t>21/11/2015</a:t>
             </a:fld>
             <a:endParaRPr lang="fr-FR"/>
           </a:p>
@@ -6318,7 +6310,7 @@
           <a:p>
             <a:fld id="{C8B1640C-39B1-1D44-972E-3A68EE7DDC87}" type="datetime1">
               <a:rPr lang="fr-FR" smtClean="0"/>
-              <a:t>20/11/2015</a:t>
+              <a:t>21/11/2015</a:t>
             </a:fld>
             <a:endParaRPr lang="fr-FR"/>
           </a:p>
@@ -6725,7 +6717,7 @@
           <a:p>
             <a:fld id="{B8393D6F-7F96-7F48-AADB-ADA6C3046919}" type="datetime1">
               <a:rPr lang="fr-FR" smtClean="0"/>
-              <a:t>20/11/2015</a:t>
+              <a:t>21/11/2015</a:t>
             </a:fld>
             <a:endParaRPr lang="fr-FR"/>
           </a:p>
@@ -6848,13 +6840,8 @@
             </a:r>
             <a:r>
               <a:rPr lang="fr-FR" dirty="0" smtClean="0"/>
-              <a:t> patches for </a:t>
-            </a:r>
-            <a:r>
-              <a:rPr lang="fr-FR" dirty="0" smtClean="0"/>
-              <a:t>bugs 625, 626, 627 and 642</a:t>
-            </a:r>
-            <a:endParaRPr lang="fr-FR" dirty="0" smtClean="0"/>
+              <a:t> patches for bugs 625, 626, 627 and 642</a:t>
+            </a:r>
           </a:p>
           <a:p>
             <a:pPr marL="514350" indent="-514350">
@@ -6881,11 +6868,7 @@
             </a:r>
             <a:r>
               <a:rPr lang="fr-FR" dirty="0" smtClean="0"/>
-              <a:t> </a:t>
-            </a:r>
-            <a:r>
-              <a:rPr lang="fr-FR" dirty="0" smtClean="0"/>
-              <a:t>and </a:t>
+              <a:t> and </a:t>
             </a:r>
             <a:r>
               <a:rPr lang="fr-FR" dirty="0" err="1" smtClean="0"/>
@@ -6962,7 +6945,7 @@
           <a:p>
             <a:fld id="{5FAEC70E-BD7A-C84E-BBB2-A6F04DF88CD6}" type="datetime1">
               <a:rPr lang="fr-FR" smtClean="0"/>
-              <a:t>20/11/2015</a:t>
+              <a:t>21/11/2015</a:t>
             </a:fld>
             <a:endParaRPr lang="fr-FR"/>
           </a:p>
@@ -7081,15 +7064,19 @@
             </a:r>
             <a:r>
               <a:rPr lang="fr-FR" sz="3200" dirty="0" smtClean="0"/>
-              <a:t> (click « all links » to </a:t>
+              <a:t> (click « all links » </a:t>
+            </a:r>
+            <a:r>
+              <a:rPr lang="fr-FR" sz="3200" dirty="0" smtClean="0"/>
+              <a:t>and « </a:t>
             </a:r>
             <a:r>
               <a:rPr lang="fr-FR" sz="3200" dirty="0" err="1" smtClean="0"/>
               <a:t>refresh</a:t>
             </a:r>
             <a:r>
-              <a:rPr lang="fr-FR" sz="3200" dirty="0" smtClean="0"/>
-              <a:t>)</a:t>
+              <a:rPr lang="fr-FR" sz="3200" smtClean="0"/>
+              <a:t> »)</a:t>
             </a:r>
             <a:endParaRPr lang="fr-FR" sz="3200" dirty="0"/>
           </a:p>
@@ -7220,7 +7207,7 @@
           <a:p>
             <a:fld id="{A983BED7-3CE8-5445-9F10-880FE77D0A8A}" type="datetime1">
               <a:rPr lang="fr-FR" smtClean="0"/>
-              <a:t>20/11/2015</a:t>
+              <a:t>21/11/2015</a:t>
             </a:fld>
             <a:endParaRPr lang="fr-FR"/>
           </a:p>
@@ -7520,7 +7507,7 @@
           <a:p>
             <a:fld id="{5FAEC70E-BD7A-C84E-BBB2-A6F04DF88CD6}" type="datetime1">
               <a:rPr lang="fr-FR" smtClean="0"/>
-              <a:t>20/11/2015</a:t>
+              <a:t>21/11/2015</a:t>
             </a:fld>
             <a:endParaRPr lang="fr-FR"/>
           </a:p>
@@ -7785,7 +7772,7 @@
           <a:p>
             <a:fld id="{062BC1FB-D1C0-D747-8D2F-B5DDBADEE4B9}" type="datetime1">
               <a:rPr lang="fr-FR" smtClean="0"/>
-              <a:t>20/11/2015</a:t>
+              <a:t>21/11/2015</a:t>
             </a:fld>
             <a:endParaRPr lang="fr-FR"/>
           </a:p>
@@ -8084,7 +8071,7 @@
           <a:p>
             <a:fld id="{26F1154D-8A10-254C-A651-5AB85C1F60B8}" type="datetime1">
               <a:rPr lang="fr-FR" smtClean="0"/>
-              <a:t>20/11/2015</a:t>
+              <a:t>21/11/2015</a:t>
             </a:fld>
             <a:endParaRPr lang="fr-FR"/>
           </a:p>
@@ -8353,7 +8340,7 @@
           <a:p>
             <a:fld id="{B12139B0-5524-B944-8CED-1C9CACAE70ED}" type="datetime1">
               <a:rPr lang="fr-FR" smtClean="0"/>
-              <a:t>20/11/2015</a:t>
+              <a:t>21/11/2015</a:t>
             </a:fld>
             <a:endParaRPr lang="fr-FR" dirty="0"/>
           </a:p>
@@ -8537,7 +8524,7 @@
           <a:p>
             <a:fld id="{D053FD6A-4CC7-EF45-AB41-64109787680A}" type="datetime1">
               <a:rPr lang="fr-FR" smtClean="0"/>
-              <a:t>20/11/2015</a:t>
+              <a:t>21/11/2015</a:t>
             </a:fld>
             <a:endParaRPr lang="fr-FR"/>
           </a:p>
@@ -8972,7 +8959,7 @@
           <a:p>
             <a:fld id="{5FAEC70E-BD7A-C84E-BBB2-A6F04DF88CD6}" type="datetime1">
               <a:rPr lang="fr-FR" smtClean="0"/>
-              <a:t>20/11/2015</a:t>
+              <a:t>21/11/2015</a:t>
             </a:fld>
             <a:endParaRPr lang="fr-FR"/>
           </a:p>
@@ -9105,7 +9092,7 @@
           <a:p>
             <a:fld id="{D053FD6A-4CC7-EF45-AB41-64109787680A}" type="datetime1">
               <a:rPr lang="fr-FR" smtClean="0"/>
-              <a:t>20/11/2015</a:t>
+              <a:t>21/11/2015</a:t>
             </a:fld>
             <a:endParaRPr lang="fr-FR"/>
           </a:p>
@@ -9469,7 +9456,7 @@
           <a:p>
             <a:fld id="{5FAEC70E-BD7A-C84E-BBB2-A6F04DF88CD6}" type="datetime1">
               <a:rPr lang="fr-FR" smtClean="0"/>
-              <a:t>20/11/2015</a:t>
+              <a:t>21/11/2015</a:t>
             </a:fld>
             <a:endParaRPr lang="fr-FR"/>
           </a:p>
@@ -9598,7 +9585,7 @@
           <a:p>
             <a:fld id="{D053FD6A-4CC7-EF45-AB41-64109787680A}" type="datetime1">
               <a:rPr lang="fr-FR" smtClean="0"/>
-              <a:t>20/11/2015</a:t>
+              <a:t>21/11/2015</a:t>
             </a:fld>
             <a:endParaRPr lang="fr-FR"/>
           </a:p>
@@ -9716,7 +9703,7 @@
           <a:p>
             <a:fld id="{D053FD6A-4CC7-EF45-AB41-64109787680A}" type="datetime1">
               <a:rPr lang="fr-FR" smtClean="0"/>
-              <a:t>20/11/2015</a:t>
+              <a:t>21/11/2015</a:t>
             </a:fld>
             <a:endParaRPr lang="fr-FR"/>
           </a:p>
@@ -9854,7 +9841,7 @@
           <a:p>
             <a:fld id="{D053FD6A-4CC7-EF45-AB41-64109787680A}" type="datetime1">
               <a:rPr lang="fr-FR" smtClean="0"/>
-              <a:t>20/11/2015</a:t>
+              <a:t>21/11/2015</a:t>
             </a:fld>
             <a:endParaRPr lang="fr-FR"/>
           </a:p>
@@ -10101,7 +10088,7 @@
           <a:p>
             <a:fld id="{5FAEC70E-BD7A-C84E-BBB2-A6F04DF88CD6}" type="datetime1">
               <a:rPr lang="fr-FR" smtClean="0"/>
-              <a:t>20/11/2015</a:t>
+              <a:t>21/11/2015</a:t>
             </a:fld>
             <a:endParaRPr lang="fr-FR"/>
           </a:p>
@@ -10226,7 +10213,7 @@
           <a:p>
             <a:fld id="{5FAEC70E-BD7A-C84E-BBB2-A6F04DF88CD6}" type="datetime1">
               <a:rPr lang="fr-FR" smtClean="0"/>
-              <a:t>20/11/2015</a:t>
+              <a:t>21/11/2015</a:t>
             </a:fld>
             <a:endParaRPr lang="fr-FR"/>
           </a:p>
@@ -10691,7 +10678,7 @@
           <a:p>
             <a:fld id="{5FAEC70E-BD7A-C84E-BBB2-A6F04DF88CD6}" type="datetime1">
               <a:rPr lang="fr-FR" smtClean="0"/>
-              <a:t>20/11/2015</a:t>
+              <a:t>21/11/2015</a:t>
             </a:fld>
             <a:endParaRPr lang="fr-FR"/>
           </a:p>
@@ -10817,7 +10804,7 @@
           <a:p>
             <a:fld id="{D053FD6A-4CC7-EF45-AB41-64109787680A}" type="datetime1">
               <a:rPr lang="fr-FR" smtClean="0"/>
-              <a:t>20/11/2015</a:t>
+              <a:t>21/11/2015</a:t>
             </a:fld>
             <a:endParaRPr lang="fr-FR"/>
           </a:p>
@@ -11261,7 +11248,7 @@
           <a:p>
             <a:fld id="{5FAEC70E-BD7A-C84E-BBB2-A6F04DF88CD6}" type="datetime1">
               <a:rPr lang="fr-FR" smtClean="0"/>
-              <a:t>20/11/2015</a:t>
+              <a:t>21/11/2015</a:t>
             </a:fld>
             <a:endParaRPr lang="fr-FR"/>
           </a:p>
@@ -11445,7 +11432,7 @@
           <a:p>
             <a:fld id="{5FAEC70E-BD7A-C84E-BBB2-A6F04DF88CD6}" type="datetime1">
               <a:rPr lang="fr-FR" smtClean="0"/>
-              <a:t>20/11/2015</a:t>
+              <a:t>21/11/2015</a:t>
             </a:fld>
             <a:endParaRPr lang="fr-FR"/>
           </a:p>
@@ -11641,7 +11628,7 @@
           <a:p>
             <a:fld id="{F4335CCC-D631-7E4D-A7CC-111A809CA31E}" type="datetime1">
               <a:rPr lang="fr-FR" smtClean="0"/>
-              <a:t>20/11/2015</a:t>
+              <a:t>21/11/2015</a:t>
             </a:fld>
             <a:endParaRPr lang="fr-FR"/>
           </a:p>
@@ -11947,7 +11934,7 @@
           <a:p>
             <a:fld id="{4FDD3FE7-4BE0-AC4F-9F41-B03702F84959}" type="datetime1">
               <a:rPr lang="fr-FR" smtClean="0"/>
-              <a:t>20/11/2015</a:t>
+              <a:t>21/11/2015</a:t>
             </a:fld>
             <a:endParaRPr lang="fr-FR"/>
           </a:p>

</xml_diff>

<commit_message>
moved update site from repository to tool chain
</commit_message>
<xml_diff>
--- a/T7.3/TraceabilityArchitecture/reqCycleUse/ReqCyclePossibleUseForArchitectureVerification-V2.pptx
+++ b/T7.3/TraceabilityArchitecture/reqCycleUse/ReqCyclePossibleUseForArchitectureVerification-V2.pptx
@@ -7992,53 +7992,202 @@
           </a:p>
         </p:txBody>
       </p:sp>
+      <p:sp>
+        <p:nvSpPr>
+          <p:cNvPr id="9" name="Espace réservé de la date 8"/>
+          <p:cNvSpPr>
+            <a:spLocks noGrp="1"/>
+          </p:cNvSpPr>
+          <p:nvPr>
+            <p:ph type="dt" sz="half" idx="10"/>
+          </p:nvPr>
+        </p:nvSpPr>
+        <p:spPr/>
+        <p:txBody>
+          <a:bodyPr/>
+          <a:lstStyle/>
+          <a:p>
+            <a:fld id="{26F1154D-8A10-254C-A651-5AB85C1F60B8}" type="datetime1">
+              <a:rPr lang="fr-FR" smtClean="0"/>
+              <a:t>23/11/2015</a:t>
+            </a:fld>
+            <a:endParaRPr lang="fr-FR"/>
+          </a:p>
+        </p:txBody>
+      </p:sp>
+      <p:sp>
+        <p:nvSpPr>
+          <p:cNvPr id="11" name="Espace réservé du numéro de diapositive 10"/>
+          <p:cNvSpPr>
+            <a:spLocks noGrp="1"/>
+          </p:cNvSpPr>
+          <p:nvPr>
+            <p:ph type="sldNum" sz="quarter" idx="12"/>
+          </p:nvPr>
+        </p:nvSpPr>
+        <p:spPr/>
+        <p:txBody>
+          <a:bodyPr/>
+          <a:lstStyle/>
+          <a:p>
+            <a:fld id="{20FE6513-1943-1341-91A6-A0721D9E69BE}" type="slidenum">
+              <a:rPr lang="fr-FR" smtClean="0"/>
+              <a:t>23</a:t>
+            </a:fld>
+            <a:endParaRPr lang="fr-FR"/>
+          </a:p>
+        </p:txBody>
+      </p:sp>
       <p:grpSp>
         <p:nvGrpSpPr>
-          <p:cNvPr id="8" name="Grouper 7"/>
+          <p:cNvPr id="4" name="Grouper 3"/>
           <p:cNvGrpSpPr/>
           <p:nvPr/>
         </p:nvGrpSpPr>
         <p:grpSpPr>
           <a:xfrm>
-            <a:off x="457200" y="3059004"/>
+            <a:off x="457200" y="2521234"/>
             <a:ext cx="8357810" cy="3723709"/>
-            <a:chOff x="217714" y="1734576"/>
+            <a:chOff x="457200" y="3059004"/>
             <a:chExt cx="8357810" cy="3723709"/>
           </a:xfrm>
         </p:grpSpPr>
-        <p:pic>
-          <p:nvPicPr>
-            <p:cNvPr id="5" name="Image 4"/>
-            <p:cNvPicPr>
-              <a:picLocks noChangeAspect="1"/>
-            </p:cNvPicPr>
+        <p:grpSp>
+          <p:nvGrpSpPr>
+            <p:cNvPr id="8" name="Grouper 7"/>
+            <p:cNvGrpSpPr/>
             <p:nvPr/>
-          </p:nvPicPr>
-          <p:blipFill>
-            <a:blip r:embed="rId2"/>
-            <a:stretch>
-              <a:fillRect/>
-            </a:stretch>
-          </p:blipFill>
-          <p:spPr>
+          </p:nvGrpSpPr>
+          <p:grpSpPr>
             <a:xfrm>
-              <a:off x="217714" y="1734576"/>
+              <a:off x="457200" y="3059004"/>
               <a:ext cx="8357810" cy="3723709"/>
+              <a:chOff x="217714" y="1734576"/>
+              <a:chExt cx="8357810" cy="3723709"/>
             </a:xfrm>
-            <a:prstGeom prst="rect">
-              <a:avLst/>
-            </a:prstGeom>
-          </p:spPr>
-        </p:pic>
+          </p:grpSpPr>
+          <p:pic>
+            <p:nvPicPr>
+              <p:cNvPr id="5" name="Image 4"/>
+              <p:cNvPicPr>
+                <a:picLocks noChangeAspect="1"/>
+              </p:cNvPicPr>
+              <p:nvPr/>
+            </p:nvPicPr>
+            <p:blipFill>
+              <a:blip r:embed="rId2"/>
+              <a:stretch>
+                <a:fillRect/>
+              </a:stretch>
+            </p:blipFill>
+            <p:spPr>
+              <a:xfrm>
+                <a:off x="217714" y="1734576"/>
+                <a:ext cx="8357810" cy="3723709"/>
+              </a:xfrm>
+              <a:prstGeom prst="rect">
+                <a:avLst/>
+              </a:prstGeom>
+            </p:spPr>
+          </p:pic>
+          <p:sp>
+            <p:nvSpPr>
+              <p:cNvPr id="6" name="Rectangle à coins arrondis 5"/>
+              <p:cNvSpPr/>
+              <p:nvPr/>
+            </p:nvSpPr>
+            <p:spPr>
+              <a:xfrm>
+                <a:off x="368905" y="2715381"/>
+                <a:ext cx="247952" cy="205619"/>
+              </a:xfrm>
+              <a:prstGeom prst="roundRect">
+                <a:avLst/>
+              </a:prstGeom>
+              <a:noFill/>
+              <a:ln w="38100" cmpd="sng">
+                <a:solidFill>
+                  <a:srgbClr val="0000FF"/>
+                </a:solidFill>
+              </a:ln>
+            </p:spPr>
+            <p:style>
+              <a:lnRef idx="1">
+                <a:schemeClr val="accent1"/>
+              </a:lnRef>
+              <a:fillRef idx="3">
+                <a:schemeClr val="accent1"/>
+              </a:fillRef>
+              <a:effectRef idx="2">
+                <a:schemeClr val="accent1"/>
+              </a:effectRef>
+              <a:fontRef idx="minor">
+                <a:schemeClr val="lt1"/>
+              </a:fontRef>
+            </p:style>
+            <p:txBody>
+              <a:bodyPr rtlCol="0" anchor="ctr"/>
+              <a:lstStyle/>
+              <a:p>
+                <a:pPr algn="ctr"/>
+                <a:endParaRPr lang="fr-FR"/>
+              </a:p>
+            </p:txBody>
+          </p:sp>
+          <p:sp>
+            <p:nvSpPr>
+              <p:cNvPr id="7" name="Rectangle à coins arrondis 6"/>
+              <p:cNvSpPr/>
+              <p:nvPr/>
+            </p:nvSpPr>
+            <p:spPr>
+              <a:xfrm>
+                <a:off x="5897637" y="4500639"/>
+                <a:ext cx="621695" cy="205619"/>
+              </a:xfrm>
+              <a:prstGeom prst="roundRect">
+                <a:avLst/>
+              </a:prstGeom>
+              <a:noFill/>
+              <a:ln w="38100" cmpd="sng">
+                <a:solidFill>
+                  <a:srgbClr val="0000FF"/>
+                </a:solidFill>
+              </a:ln>
+            </p:spPr>
+            <p:style>
+              <a:lnRef idx="1">
+                <a:schemeClr val="accent1"/>
+              </a:lnRef>
+              <a:fillRef idx="3">
+                <a:schemeClr val="accent1"/>
+              </a:fillRef>
+              <a:effectRef idx="2">
+                <a:schemeClr val="accent1"/>
+              </a:effectRef>
+              <a:fontRef idx="minor">
+                <a:schemeClr val="lt1"/>
+              </a:fontRef>
+            </p:style>
+            <p:txBody>
+              <a:bodyPr rtlCol="0" anchor="ctr"/>
+              <a:lstStyle/>
+              <a:p>
+                <a:pPr algn="ctr"/>
+                <a:endParaRPr lang="fr-FR"/>
+              </a:p>
+            </p:txBody>
+          </p:sp>
+        </p:grpSp>
         <p:sp>
           <p:nvSpPr>
-            <p:cNvPr id="6" name="Rectangle à coins arrondis 5"/>
+            <p:cNvPr id="10" name="Rectangle à coins arrondis 9"/>
             <p:cNvSpPr/>
             <p:nvPr/>
           </p:nvSpPr>
           <p:spPr>
             <a:xfrm>
-              <a:off x="368905" y="2715381"/>
+              <a:off x="3666735" y="5416495"/>
               <a:ext cx="247952" cy="205619"/>
             </a:xfrm>
             <a:prstGeom prst="roundRect">
@@ -8076,24 +8225,21 @@
         </p:sp>
         <p:sp>
           <p:nvSpPr>
-            <p:cNvPr id="7" name="Rectangle à coins arrondis 6"/>
+            <p:cNvPr id="3" name="Flèche vers la droite 2"/>
             <p:cNvSpPr/>
             <p:nvPr/>
           </p:nvSpPr>
           <p:spPr>
             <a:xfrm>
-              <a:off x="5897637" y="4500639"/>
-              <a:ext cx="621695" cy="205619"/>
+              <a:off x="3914687" y="5416495"/>
+              <a:ext cx="272619" cy="205619"/>
             </a:xfrm>
-            <a:prstGeom prst="roundRect">
+            <a:prstGeom prst="rightArrow">
               <a:avLst/>
             </a:prstGeom>
-            <a:noFill/>
-            <a:ln w="38100" cmpd="sng">
-              <a:solidFill>
-                <a:srgbClr val="0000FF"/>
-              </a:solidFill>
-            </a:ln>
+            <a:solidFill>
+              <a:srgbClr val="0000FF"/>
+            </a:solidFill>
           </p:spPr>
           <p:style>
             <a:lnRef idx="1">
@@ -8119,137 +8265,6 @@
           </p:txBody>
         </p:sp>
       </p:grpSp>
-      <p:sp>
-        <p:nvSpPr>
-          <p:cNvPr id="9" name="Espace réservé de la date 8"/>
-          <p:cNvSpPr>
-            <a:spLocks noGrp="1"/>
-          </p:cNvSpPr>
-          <p:nvPr>
-            <p:ph type="dt" sz="half" idx="10"/>
-          </p:nvPr>
-        </p:nvSpPr>
-        <p:spPr/>
-        <p:txBody>
-          <a:bodyPr/>
-          <a:lstStyle/>
-          <a:p>
-            <a:fld id="{26F1154D-8A10-254C-A651-5AB85C1F60B8}" type="datetime1">
-              <a:rPr lang="fr-FR" smtClean="0"/>
-              <a:t>23/11/2015</a:t>
-            </a:fld>
-            <a:endParaRPr lang="fr-FR"/>
-          </a:p>
-        </p:txBody>
-      </p:sp>
-      <p:sp>
-        <p:nvSpPr>
-          <p:cNvPr id="11" name="Espace réservé du numéro de diapositive 10"/>
-          <p:cNvSpPr>
-            <a:spLocks noGrp="1"/>
-          </p:cNvSpPr>
-          <p:nvPr>
-            <p:ph type="sldNum" sz="quarter" idx="12"/>
-          </p:nvPr>
-        </p:nvSpPr>
-        <p:spPr/>
-        <p:txBody>
-          <a:bodyPr/>
-          <a:lstStyle/>
-          <a:p>
-            <a:fld id="{20FE6513-1943-1341-91A6-A0721D9E69BE}" type="slidenum">
-              <a:rPr lang="fr-FR" smtClean="0"/>
-              <a:t>23</a:t>
-            </a:fld>
-            <a:endParaRPr lang="fr-FR"/>
-          </a:p>
-        </p:txBody>
-      </p:sp>
-      <p:sp>
-        <p:nvSpPr>
-          <p:cNvPr id="10" name="Rectangle à coins arrondis 9"/>
-          <p:cNvSpPr/>
-          <p:nvPr/>
-        </p:nvSpPr>
-        <p:spPr>
-          <a:xfrm>
-            <a:off x="3666735" y="5416495"/>
-            <a:ext cx="247952" cy="205619"/>
-          </a:xfrm>
-          <a:prstGeom prst="roundRect">
-            <a:avLst/>
-          </a:prstGeom>
-          <a:noFill/>
-          <a:ln w="38100" cmpd="sng">
-            <a:solidFill>
-              <a:srgbClr val="0000FF"/>
-            </a:solidFill>
-          </a:ln>
-        </p:spPr>
-        <p:style>
-          <a:lnRef idx="1">
-            <a:schemeClr val="accent1"/>
-          </a:lnRef>
-          <a:fillRef idx="3">
-            <a:schemeClr val="accent1"/>
-          </a:fillRef>
-          <a:effectRef idx="2">
-            <a:schemeClr val="accent1"/>
-          </a:effectRef>
-          <a:fontRef idx="minor">
-            <a:schemeClr val="lt1"/>
-          </a:fontRef>
-        </p:style>
-        <p:txBody>
-          <a:bodyPr rtlCol="0" anchor="ctr"/>
-          <a:lstStyle/>
-          <a:p>
-            <a:pPr algn="ctr"/>
-            <a:endParaRPr lang="fr-FR"/>
-          </a:p>
-        </p:txBody>
-      </p:sp>
-      <p:sp>
-        <p:nvSpPr>
-          <p:cNvPr id="3" name="Flèche vers la droite 2"/>
-          <p:cNvSpPr/>
-          <p:nvPr/>
-        </p:nvSpPr>
-        <p:spPr>
-          <a:xfrm>
-            <a:off x="3914687" y="5416495"/>
-            <a:ext cx="272619" cy="205619"/>
-          </a:xfrm>
-          <a:prstGeom prst="rightArrow">
-            <a:avLst/>
-          </a:prstGeom>
-          <a:solidFill>
-            <a:srgbClr val="0000FF"/>
-          </a:solidFill>
-        </p:spPr>
-        <p:style>
-          <a:lnRef idx="1">
-            <a:schemeClr val="accent1"/>
-          </a:lnRef>
-          <a:fillRef idx="3">
-            <a:schemeClr val="accent1"/>
-          </a:fillRef>
-          <a:effectRef idx="2">
-            <a:schemeClr val="accent1"/>
-          </a:effectRef>
-          <a:fontRef idx="minor">
-            <a:schemeClr val="lt1"/>
-          </a:fontRef>
-        </p:style>
-        <p:txBody>
-          <a:bodyPr rtlCol="0" anchor="ctr"/>
-          <a:lstStyle/>
-          <a:p>
-            <a:pPr algn="ctr"/>
-            <a:endParaRPr lang="fr-FR"/>
-          </a:p>
-        </p:txBody>
-      </p:sp>
     </p:spTree>
     <p:extLst>
       <p:ext uri="{BB962C8B-B14F-4D97-AF65-F5344CB8AC3E}">
@@ -8287,30 +8302,6 @@
           <a:chExt cx="0" cy="0"/>
         </a:xfrm>
       </p:grpSpPr>
-      <p:pic>
-        <p:nvPicPr>
-          <p:cNvPr id="10" name="Image 9"/>
-          <p:cNvPicPr>
-            <a:picLocks noChangeAspect="1"/>
-          </p:cNvPicPr>
-          <p:nvPr/>
-        </p:nvPicPr>
-        <p:blipFill>
-          <a:blip r:embed="rId2"/>
-          <a:stretch>
-            <a:fillRect/>
-          </a:stretch>
-        </p:blipFill>
-        <p:spPr>
-          <a:xfrm>
-            <a:off x="641048" y="1101127"/>
-            <a:ext cx="8345714" cy="5404240"/>
-          </a:xfrm>
-          <a:prstGeom prst="rect">
-            <a:avLst/>
-          </a:prstGeom>
-        </p:spPr>
-      </p:pic>
       <p:sp>
         <p:nvSpPr>
           <p:cNvPr id="2" name="Titre 1"/>
@@ -8382,94 +8373,6 @@
       </p:sp>
       <p:sp>
         <p:nvSpPr>
-          <p:cNvPr id="4" name="Rectangle à coins arrondis 3"/>
-          <p:cNvSpPr/>
-          <p:nvPr/>
-        </p:nvSpPr>
-        <p:spPr>
-          <a:xfrm>
-            <a:off x="641048" y="3199191"/>
-            <a:ext cx="8345714" cy="102809"/>
-          </a:xfrm>
-          <a:prstGeom prst="roundRect">
-            <a:avLst/>
-          </a:prstGeom>
-          <a:noFill/>
-          <a:ln>
-            <a:solidFill>
-              <a:srgbClr val="0000FF"/>
-            </a:solidFill>
-          </a:ln>
-        </p:spPr>
-        <p:style>
-          <a:lnRef idx="1">
-            <a:schemeClr val="accent1"/>
-          </a:lnRef>
-          <a:fillRef idx="3">
-            <a:schemeClr val="accent1"/>
-          </a:fillRef>
-          <a:effectRef idx="2">
-            <a:schemeClr val="accent1"/>
-          </a:effectRef>
-          <a:fontRef idx="minor">
-            <a:schemeClr val="lt1"/>
-          </a:fontRef>
-        </p:style>
-        <p:txBody>
-          <a:bodyPr rtlCol="0" anchor="ctr"/>
-          <a:lstStyle/>
-          <a:p>
-            <a:pPr algn="ctr"/>
-            <a:endParaRPr lang="fr-FR"/>
-          </a:p>
-        </p:txBody>
-      </p:sp>
-      <p:sp>
-        <p:nvSpPr>
-          <p:cNvPr id="5" name="Rectangle à coins arrondis 4"/>
-          <p:cNvSpPr/>
-          <p:nvPr/>
-        </p:nvSpPr>
-        <p:spPr>
-          <a:xfrm>
-            <a:off x="641048" y="6278637"/>
-            <a:ext cx="8291285" cy="102809"/>
-          </a:xfrm>
-          <a:prstGeom prst="roundRect">
-            <a:avLst/>
-          </a:prstGeom>
-          <a:noFill/>
-          <a:ln>
-            <a:solidFill>
-              <a:srgbClr val="0000FF"/>
-            </a:solidFill>
-          </a:ln>
-        </p:spPr>
-        <p:style>
-          <a:lnRef idx="1">
-            <a:schemeClr val="accent1"/>
-          </a:lnRef>
-          <a:fillRef idx="3">
-            <a:schemeClr val="accent1"/>
-          </a:fillRef>
-          <a:effectRef idx="2">
-            <a:schemeClr val="accent1"/>
-          </a:effectRef>
-          <a:fontRef idx="minor">
-            <a:schemeClr val="lt1"/>
-          </a:fontRef>
-        </p:style>
-        <p:txBody>
-          <a:bodyPr rtlCol="0" anchor="ctr"/>
-          <a:lstStyle/>
-          <a:p>
-            <a:pPr algn="ctr"/>
-            <a:endParaRPr lang="fr-FR"/>
-          </a:p>
-        </p:txBody>
-      </p:sp>
-      <p:sp>
-        <p:nvSpPr>
           <p:cNvPr id="6" name="Espace réservé de la date 5"/>
           <p:cNvSpPr>
             <a:spLocks noGrp="1"/>
@@ -8519,50 +8422,177 @@
           </a:p>
         </p:txBody>
       </p:sp>
-      <p:sp>
-        <p:nvSpPr>
-          <p:cNvPr id="11" name="Rectangle à coins arrondis 10"/>
-          <p:cNvSpPr/>
+      <p:grpSp>
+        <p:nvGrpSpPr>
+          <p:cNvPr id="3" name="Grouper 2"/>
+          <p:cNvGrpSpPr/>
           <p:nvPr/>
-        </p:nvSpPr>
-        <p:spPr>
+        </p:nvGrpSpPr>
+        <p:grpSpPr>
           <a:xfrm>
-            <a:off x="6682618" y="1212007"/>
-            <a:ext cx="882953" cy="178946"/>
+            <a:off x="641048" y="1101127"/>
+            <a:ext cx="8345714" cy="5404240"/>
+            <a:chOff x="641048" y="1101127"/>
+            <a:chExt cx="8345714" cy="5404240"/>
           </a:xfrm>
-          <a:prstGeom prst="roundRect">
-            <a:avLst/>
-          </a:prstGeom>
-          <a:noFill/>
-          <a:ln>
-            <a:solidFill>
-              <a:srgbClr val="0000FF"/>
-            </a:solidFill>
-          </a:ln>
-        </p:spPr>
-        <p:style>
-          <a:lnRef idx="1">
-            <a:schemeClr val="accent1"/>
-          </a:lnRef>
-          <a:fillRef idx="3">
-            <a:schemeClr val="accent1"/>
-          </a:fillRef>
-          <a:effectRef idx="2">
-            <a:schemeClr val="accent1"/>
-          </a:effectRef>
-          <a:fontRef idx="minor">
-            <a:schemeClr val="lt1"/>
-          </a:fontRef>
-        </p:style>
-        <p:txBody>
-          <a:bodyPr rtlCol="0" anchor="ctr"/>
-          <a:lstStyle/>
-          <a:p>
-            <a:pPr algn="ctr"/>
-            <a:endParaRPr lang="fr-FR"/>
-          </a:p>
-        </p:txBody>
-      </p:sp>
+        </p:grpSpPr>
+        <p:pic>
+          <p:nvPicPr>
+            <p:cNvPr id="10" name="Image 9"/>
+            <p:cNvPicPr>
+              <a:picLocks noChangeAspect="1"/>
+            </p:cNvPicPr>
+            <p:nvPr/>
+          </p:nvPicPr>
+          <p:blipFill>
+            <a:blip r:embed="rId2"/>
+            <a:stretch>
+              <a:fillRect/>
+            </a:stretch>
+          </p:blipFill>
+          <p:spPr>
+            <a:xfrm>
+              <a:off x="641048" y="1101127"/>
+              <a:ext cx="8345714" cy="5404240"/>
+            </a:xfrm>
+            <a:prstGeom prst="rect">
+              <a:avLst/>
+            </a:prstGeom>
+          </p:spPr>
+        </p:pic>
+        <p:sp>
+          <p:nvSpPr>
+            <p:cNvPr id="4" name="Rectangle à coins arrondis 3"/>
+            <p:cNvSpPr/>
+            <p:nvPr/>
+          </p:nvSpPr>
+          <p:spPr>
+            <a:xfrm>
+              <a:off x="641048" y="3199191"/>
+              <a:ext cx="8345714" cy="102809"/>
+            </a:xfrm>
+            <a:prstGeom prst="roundRect">
+              <a:avLst/>
+            </a:prstGeom>
+            <a:noFill/>
+            <a:ln>
+              <a:solidFill>
+                <a:srgbClr val="0000FF"/>
+              </a:solidFill>
+            </a:ln>
+          </p:spPr>
+          <p:style>
+            <a:lnRef idx="1">
+              <a:schemeClr val="accent1"/>
+            </a:lnRef>
+            <a:fillRef idx="3">
+              <a:schemeClr val="accent1"/>
+            </a:fillRef>
+            <a:effectRef idx="2">
+              <a:schemeClr val="accent1"/>
+            </a:effectRef>
+            <a:fontRef idx="minor">
+              <a:schemeClr val="lt1"/>
+            </a:fontRef>
+          </p:style>
+          <p:txBody>
+            <a:bodyPr rtlCol="0" anchor="ctr"/>
+            <a:lstStyle/>
+            <a:p>
+              <a:pPr algn="ctr"/>
+              <a:endParaRPr lang="fr-FR"/>
+            </a:p>
+          </p:txBody>
+        </p:sp>
+        <p:sp>
+          <p:nvSpPr>
+            <p:cNvPr id="5" name="Rectangle à coins arrondis 4"/>
+            <p:cNvSpPr/>
+            <p:nvPr/>
+          </p:nvSpPr>
+          <p:spPr>
+            <a:xfrm>
+              <a:off x="641048" y="6278637"/>
+              <a:ext cx="8291285" cy="102809"/>
+            </a:xfrm>
+            <a:prstGeom prst="roundRect">
+              <a:avLst/>
+            </a:prstGeom>
+            <a:noFill/>
+            <a:ln>
+              <a:solidFill>
+                <a:srgbClr val="0000FF"/>
+              </a:solidFill>
+            </a:ln>
+          </p:spPr>
+          <p:style>
+            <a:lnRef idx="1">
+              <a:schemeClr val="accent1"/>
+            </a:lnRef>
+            <a:fillRef idx="3">
+              <a:schemeClr val="accent1"/>
+            </a:fillRef>
+            <a:effectRef idx="2">
+              <a:schemeClr val="accent1"/>
+            </a:effectRef>
+            <a:fontRef idx="minor">
+              <a:schemeClr val="lt1"/>
+            </a:fontRef>
+          </p:style>
+          <p:txBody>
+            <a:bodyPr rtlCol="0" anchor="ctr"/>
+            <a:lstStyle/>
+            <a:p>
+              <a:pPr algn="ctr"/>
+              <a:endParaRPr lang="fr-FR"/>
+            </a:p>
+          </p:txBody>
+        </p:sp>
+        <p:sp>
+          <p:nvSpPr>
+            <p:cNvPr id="11" name="Rectangle à coins arrondis 10"/>
+            <p:cNvSpPr/>
+            <p:nvPr/>
+          </p:nvSpPr>
+          <p:spPr>
+            <a:xfrm>
+              <a:off x="6682618" y="1212007"/>
+              <a:ext cx="882953" cy="178946"/>
+            </a:xfrm>
+            <a:prstGeom prst="roundRect">
+              <a:avLst/>
+            </a:prstGeom>
+            <a:noFill/>
+            <a:ln>
+              <a:solidFill>
+                <a:srgbClr val="0000FF"/>
+              </a:solidFill>
+            </a:ln>
+          </p:spPr>
+          <p:style>
+            <a:lnRef idx="1">
+              <a:schemeClr val="accent1"/>
+            </a:lnRef>
+            <a:fillRef idx="3">
+              <a:schemeClr val="accent1"/>
+            </a:fillRef>
+            <a:effectRef idx="2">
+              <a:schemeClr val="accent1"/>
+            </a:effectRef>
+            <a:fontRef idx="minor">
+              <a:schemeClr val="lt1"/>
+            </a:fontRef>
+          </p:style>
+          <p:txBody>
+            <a:bodyPr rtlCol="0" anchor="ctr"/>
+            <a:lstStyle/>
+            <a:p>
+              <a:pPr algn="ctr"/>
+              <a:endParaRPr lang="fr-FR"/>
+            </a:p>
+          </p:txBody>
+        </p:sp>
+      </p:grpSp>
     </p:spTree>
     <p:extLst>
       <p:ext uri="{BB962C8B-B14F-4D97-AF65-F5344CB8AC3E}">
@@ -10503,9 +10533,26 @@
               <a:rPr lang="fr-FR" dirty="0">
                 <a:hlinkClick r:id="rId2"/>
               </a:rPr>
-              <a:t>https://github.com/openETCS/toolchain/blob/master/T7.3/TraceabilityArchitecture/reqCycleUse/openETCS-ReqCycle-updatesite-0.8.0-Luna.zip</a:t>
-            </a:r>
-            <a:endParaRPr lang="fr-FR" dirty="0"/>
+              <a:t>https://github.com/openETCS/toolchain/raw/master/tool/reqcycle-update-site-</a:t>
+            </a:r>
+            <a:r>
+              <a:rPr lang="fr-FR" dirty="0" smtClean="0">
+                <a:hlinkClick r:id="rId2"/>
+              </a:rPr>
+              <a:t>0.8.0</a:t>
+            </a:r>
+            <a:endParaRPr lang="fr-FR" dirty="0" smtClean="0"/>
+          </a:p>
+          <a:p>
+            <a:pPr lvl="1"/>
+            <a:r>
+              <a:rPr lang="fr-FR" dirty="0" smtClean="0"/>
+              <a:t>In </a:t>
+            </a:r>
+            <a:r>
+              <a:rPr lang="fr-FR" dirty="0" smtClean="0"/>
+              <a:t>Eclipse, go to menu Help&gt;Install new software...</a:t>
+            </a:r>
           </a:p>
           <a:p>
             <a:pPr marL="514350" indent="-514350">
@@ -10514,21 +10561,11 @@
             </a:pPr>
             <a:r>
               <a:rPr lang="fr-FR" dirty="0" smtClean="0"/>
-              <a:t>In Eclipse, go </a:t>
+              <a:t>On </a:t>
             </a:r>
             <a:r>
               <a:rPr lang="fr-FR" dirty="0"/>
-              <a:t>to menu Help&gt;Install new software...</a:t>
-            </a:r>
-          </a:p>
-          <a:p>
-            <a:pPr marL="514350" indent="-514350">
-              <a:buFont typeface="+mj-lt"/>
-              <a:buAutoNum type="arabicPeriod"/>
-            </a:pPr>
-            <a:r>
-              <a:rPr lang="fr-FR" dirty="0"/>
-              <a:t>On the top area, click "</a:t>
+              <a:t>the top area, click "</a:t>
             </a:r>
             <a:r>
               <a:rPr lang="fr-FR" dirty="0" err="1"/>

</xml_diff>